<commit_message>
slide updates. Recommended due dates
</commit_message>
<xml_diff>
--- a/slides/03-KnowledgeRepresentation.pptx
+++ b/slides/03-KnowledgeRepresentation.pptx
@@ -282,7 +282,7 @@
           <a:p>
             <a:fld id="{536D3F64-4F76-4113-9476-27352AF9D4DA}" type="datetimeFigureOut">
               <a:rPr lang="en-US" smtClean="0"/>
-              <a:t>8/31/2015</a:t>
+              <a:t>2/9/21</a:t>
             </a:fld>
             <a:endParaRPr lang="en-US"/>
           </a:p>
@@ -346,38 +346,37 @@
           <a:p>
             <a:pPr lvl="0"/>
             <a:r>
-              <a:rPr lang="en-US" smtClean="0"/>
+              <a:rPr lang="en-US"/>
               <a:t>Click to edit Master text styles</a:t>
             </a:r>
           </a:p>
           <a:p>
             <a:pPr lvl="1"/>
             <a:r>
-              <a:rPr lang="en-US" smtClean="0"/>
+              <a:rPr lang="en-US"/>
               <a:t>Second level</a:t>
             </a:r>
           </a:p>
           <a:p>
             <a:pPr lvl="2"/>
             <a:r>
-              <a:rPr lang="en-US" smtClean="0"/>
+              <a:rPr lang="en-US"/>
               <a:t>Third level</a:t>
             </a:r>
           </a:p>
           <a:p>
             <a:pPr lvl="3"/>
             <a:r>
-              <a:rPr lang="en-US" smtClean="0"/>
+              <a:rPr lang="en-US"/>
               <a:t>Fourth level</a:t>
             </a:r>
           </a:p>
           <a:p>
             <a:pPr lvl="4"/>
             <a:r>
-              <a:rPr lang="en-US" smtClean="0"/>
+              <a:rPr lang="en-US"/>
               <a:t>Fifth level</a:t>
             </a:r>
-            <a:endParaRPr lang="en-US"/>
           </a:p>
         </p:txBody>
       </p:sp>
@@ -678,7 +677,7 @@
           </a:lstStyle>
           <a:p>
             <a:r>
-              <a:rPr lang="en-US" smtClean="0"/>
+              <a:rPr lang="en-US"/>
               <a:t>Click to edit Master title style</a:t>
             </a:r>
             <a:endParaRPr lang="en-US" dirty="0"/>
@@ -795,7 +794,7 @@
           </a:lstStyle>
           <a:p>
             <a:r>
-              <a:rPr lang="en-US" smtClean="0"/>
+              <a:rPr lang="en-US"/>
               <a:t>Click to edit Master subtitle style</a:t>
             </a:r>
             <a:endParaRPr lang="en-US" dirty="0"/>
@@ -962,7 +961,7 @@
           </a:lstStyle>
           <a:p>
             <a:r>
-              <a:rPr lang="en-US" smtClean="0"/>
+              <a:rPr lang="en-US"/>
               <a:t>Click to edit Master title style</a:t>
             </a:r>
             <a:endParaRPr lang="en-US" dirty="0"/>
@@ -1036,7 +1035,7 @@
           </a:lstStyle>
           <a:p>
             <a:r>
-              <a:rPr lang="en-US" smtClean="0"/>
+              <a:rPr lang="en-US"/>
               <a:t>Click icon to add picture</a:t>
             </a:r>
             <a:endParaRPr lang="en-US" dirty="0"/>
@@ -1102,7 +1101,7 @@
           <a:p>
             <a:pPr lvl="0"/>
             <a:r>
-              <a:rPr lang="en-US" smtClean="0"/>
+              <a:rPr lang="en-US"/>
               <a:t>Click to edit Master text styles</a:t>
             </a:r>
           </a:p>
@@ -1236,7 +1235,7 @@
           </a:lstStyle>
           <a:p>
             <a:r>
-              <a:rPr lang="en-US" smtClean="0"/>
+              <a:rPr lang="en-US"/>
               <a:t>Click to edit Master title style</a:t>
             </a:r>
             <a:endParaRPr lang="en-US" dirty="0"/>
@@ -1302,7 +1301,7 @@
           <a:p>
             <a:pPr lvl="0"/>
             <a:r>
-              <a:rPr lang="en-US" smtClean="0"/>
+              <a:rPr lang="en-US"/>
               <a:t>Click to edit Master text styles</a:t>
             </a:r>
           </a:p>
@@ -1436,7 +1435,7 @@
           </a:lstStyle>
           <a:p>
             <a:r>
-              <a:rPr lang="en-US" smtClean="0"/>
+              <a:rPr lang="en-US"/>
               <a:t>Click to edit Master title style</a:t>
             </a:r>
             <a:endParaRPr lang="en-US" dirty="0"/>
@@ -1504,7 +1503,7 @@
           <a:p>
             <a:pPr lvl="0"/>
             <a:r>
-              <a:rPr lang="en-US" smtClean="0"/>
+              <a:rPr lang="en-US"/>
               <a:t>Click to edit Master text styles</a:t>
             </a:r>
           </a:p>
@@ -1571,7 +1570,7 @@
           <a:p>
             <a:pPr lvl="0"/>
             <a:r>
-              <a:rPr lang="en-US" smtClean="0"/>
+              <a:rPr lang="en-US"/>
               <a:t>Click to edit Master text styles</a:t>
             </a:r>
           </a:p>
@@ -1937,7 +1936,7 @@
           </a:lstStyle>
           <a:p>
             <a:r>
-              <a:rPr lang="en-US" smtClean="0"/>
+              <a:rPr lang="en-US"/>
               <a:t>Click to edit Master title style</a:t>
             </a:r>
             <a:endParaRPr lang="en-US" dirty="0"/>
@@ -2003,7 +2002,7 @@
           <a:p>
             <a:pPr lvl="0"/>
             <a:r>
-              <a:rPr lang="en-US" smtClean="0"/>
+              <a:rPr lang="en-US"/>
               <a:t>Click to edit Master text styles</a:t>
             </a:r>
           </a:p>
@@ -2133,7 +2132,7 @@
           <a:lstStyle/>
           <a:p>
             <a:r>
-              <a:rPr lang="en-US" smtClean="0"/>
+              <a:rPr lang="en-US"/>
               <a:t>Click to edit Master title style</a:t>
             </a:r>
             <a:endParaRPr lang="en-US" dirty="0"/>
@@ -2205,7 +2204,7 @@
           <a:p>
             <a:pPr lvl="0"/>
             <a:r>
-              <a:rPr lang="en-US" smtClean="0"/>
+              <a:rPr lang="en-US"/>
               <a:t>Click to edit Master text styles</a:t>
             </a:r>
           </a:p>
@@ -2272,7 +2271,7 @@
           <a:p>
             <a:pPr lvl="0"/>
             <a:r>
-              <a:rPr lang="en-US" smtClean="0"/>
+              <a:rPr lang="en-US"/>
               <a:t>Click to edit Master text styles</a:t>
             </a:r>
           </a:p>
@@ -2343,7 +2342,7 @@
           <a:p>
             <a:pPr lvl="0"/>
             <a:r>
-              <a:rPr lang="en-US" smtClean="0"/>
+              <a:rPr lang="en-US"/>
               <a:t>Click to edit Master text styles</a:t>
             </a:r>
           </a:p>
@@ -2410,7 +2409,7 @@
           <a:p>
             <a:pPr lvl="0"/>
             <a:r>
-              <a:rPr lang="en-US" smtClean="0"/>
+              <a:rPr lang="en-US"/>
               <a:t>Click to edit Master text styles</a:t>
             </a:r>
           </a:p>
@@ -2481,7 +2480,7 @@
           <a:p>
             <a:pPr lvl="0"/>
             <a:r>
-              <a:rPr lang="en-US" smtClean="0"/>
+              <a:rPr lang="en-US"/>
               <a:t>Click to edit Master text styles</a:t>
             </a:r>
           </a:p>
@@ -2548,7 +2547,7 @@
           <a:p>
             <a:pPr lvl="0"/>
             <a:r>
-              <a:rPr lang="en-US" smtClean="0"/>
+              <a:rPr lang="en-US"/>
               <a:t>Click to edit Master text styles</a:t>
             </a:r>
           </a:p>
@@ -2768,7 +2767,7 @@
           <a:lstStyle/>
           <a:p>
             <a:r>
-              <a:rPr lang="en-US" smtClean="0"/>
+              <a:rPr lang="en-US"/>
               <a:t>Click to edit Master title style</a:t>
             </a:r>
             <a:endParaRPr lang="en-US" dirty="0"/>
@@ -2840,7 +2839,7 @@
           <a:p>
             <a:pPr lvl="0"/>
             <a:r>
-              <a:rPr lang="en-US" smtClean="0"/>
+              <a:rPr lang="en-US"/>
               <a:t>Click to edit Master text styles</a:t>
             </a:r>
           </a:p>
@@ -2918,7 +2917,7 @@
           </a:lstStyle>
           <a:p>
             <a:r>
-              <a:rPr lang="en-US" smtClean="0"/>
+              <a:rPr lang="en-US"/>
               <a:t>Click icon to add picture</a:t>
             </a:r>
             <a:endParaRPr lang="en-US" dirty="0"/>
@@ -2986,7 +2985,7 @@
           <a:p>
             <a:pPr lvl="0"/>
             <a:r>
-              <a:rPr lang="en-US" smtClean="0"/>
+              <a:rPr lang="en-US"/>
               <a:t>Click to edit Master text styles</a:t>
             </a:r>
           </a:p>
@@ -3057,7 +3056,7 @@
           <a:p>
             <a:pPr lvl="0"/>
             <a:r>
-              <a:rPr lang="en-US" smtClean="0"/>
+              <a:rPr lang="en-US"/>
               <a:t>Click to edit Master text styles</a:t>
             </a:r>
           </a:p>
@@ -3135,7 +3134,7 @@
           </a:lstStyle>
           <a:p>
             <a:r>
-              <a:rPr lang="en-US" smtClean="0"/>
+              <a:rPr lang="en-US"/>
               <a:t>Click icon to add picture</a:t>
             </a:r>
             <a:endParaRPr lang="en-US" dirty="0"/>
@@ -3203,7 +3202,7 @@
           <a:p>
             <a:pPr lvl="0"/>
             <a:r>
-              <a:rPr lang="en-US" smtClean="0"/>
+              <a:rPr lang="en-US"/>
               <a:t>Click to edit Master text styles</a:t>
             </a:r>
           </a:p>
@@ -3274,7 +3273,7 @@
           <a:p>
             <a:pPr lvl="0"/>
             <a:r>
-              <a:rPr lang="en-US" smtClean="0"/>
+              <a:rPr lang="en-US"/>
               <a:t>Click to edit Master text styles</a:t>
             </a:r>
           </a:p>
@@ -3352,7 +3351,7 @@
           </a:lstStyle>
           <a:p>
             <a:r>
-              <a:rPr lang="en-US" smtClean="0"/>
+              <a:rPr lang="en-US"/>
               <a:t>Click icon to add picture</a:t>
             </a:r>
             <a:endParaRPr lang="en-US" dirty="0"/>
@@ -3420,7 +3419,7 @@
           <a:p>
             <a:pPr lvl="0"/>
             <a:r>
-              <a:rPr lang="en-US" smtClean="0"/>
+              <a:rPr lang="en-US"/>
               <a:t>Click to edit Master text styles</a:t>
             </a:r>
           </a:p>
@@ -3545,7 +3544,7 @@
           <a:lstStyle/>
           <a:p>
             <a:r>
-              <a:rPr lang="en-US" smtClean="0"/>
+              <a:rPr lang="en-US"/>
               <a:t>Click to edit Master title style</a:t>
             </a:r>
             <a:endParaRPr lang="en-US" dirty="0"/>
@@ -3569,35 +3568,35 @@
           <a:p>
             <a:pPr lvl="0"/>
             <a:r>
-              <a:rPr lang="en-US" smtClean="0"/>
+              <a:rPr lang="en-US"/>
               <a:t>Click to edit Master text styles</a:t>
             </a:r>
           </a:p>
           <a:p>
             <a:pPr lvl="1"/>
             <a:r>
-              <a:rPr lang="en-US" smtClean="0"/>
+              <a:rPr lang="en-US"/>
               <a:t>Second level</a:t>
             </a:r>
           </a:p>
           <a:p>
             <a:pPr lvl="2"/>
             <a:r>
-              <a:rPr lang="en-US" smtClean="0"/>
+              <a:rPr lang="en-US"/>
               <a:t>Third level</a:t>
             </a:r>
           </a:p>
           <a:p>
             <a:pPr lvl="3"/>
             <a:r>
-              <a:rPr lang="en-US" smtClean="0"/>
+              <a:rPr lang="en-US"/>
               <a:t>Fourth level</a:t>
             </a:r>
           </a:p>
           <a:p>
             <a:pPr lvl="4"/>
             <a:r>
-              <a:rPr lang="en-US" smtClean="0"/>
+              <a:rPr lang="en-US"/>
               <a:t>Fifth level</a:t>
             </a:r>
             <a:endParaRPr lang="en-US" dirty="0"/>
@@ -3732,7 +3731,7 @@
           </a:lstStyle>
           <a:p>
             <a:r>
-              <a:rPr lang="en-US" smtClean="0"/>
+              <a:rPr lang="en-US"/>
               <a:t>Click to edit Master title style</a:t>
             </a:r>
             <a:endParaRPr lang="en-US" dirty="0"/>
@@ -3761,35 +3760,35 @@
           <a:p>
             <a:pPr lvl="0"/>
             <a:r>
-              <a:rPr lang="en-US" smtClean="0"/>
+              <a:rPr lang="en-US"/>
               <a:t>Click to edit Master text styles</a:t>
             </a:r>
           </a:p>
           <a:p>
             <a:pPr lvl="1"/>
             <a:r>
-              <a:rPr lang="en-US" smtClean="0"/>
+              <a:rPr lang="en-US"/>
               <a:t>Second level</a:t>
             </a:r>
           </a:p>
           <a:p>
             <a:pPr lvl="2"/>
             <a:r>
-              <a:rPr lang="en-US" smtClean="0"/>
+              <a:rPr lang="en-US"/>
               <a:t>Third level</a:t>
             </a:r>
           </a:p>
           <a:p>
             <a:pPr lvl="3"/>
             <a:r>
-              <a:rPr lang="en-US" smtClean="0"/>
+              <a:rPr lang="en-US"/>
               <a:t>Fourth level</a:t>
             </a:r>
           </a:p>
           <a:p>
             <a:pPr lvl="4"/>
             <a:r>
-              <a:rPr lang="en-US" smtClean="0"/>
+              <a:rPr lang="en-US"/>
               <a:t>Fifth level</a:t>
             </a:r>
             <a:endParaRPr lang="en-US" dirty="0"/>
@@ -3915,7 +3914,7 @@
           <a:lstStyle/>
           <a:p>
             <a:r>
-              <a:rPr lang="en-US" smtClean="0"/>
+              <a:rPr lang="en-US"/>
               <a:t>Click to edit Master title style</a:t>
             </a:r>
             <a:endParaRPr lang="en-US" dirty="0"/>
@@ -3939,35 +3938,35 @@
           <a:p>
             <a:pPr lvl="0"/>
             <a:r>
-              <a:rPr lang="en-US" smtClean="0"/>
+              <a:rPr lang="en-US"/>
               <a:t>Click to edit Master text styles</a:t>
             </a:r>
           </a:p>
           <a:p>
             <a:pPr lvl="1"/>
             <a:r>
-              <a:rPr lang="en-US" smtClean="0"/>
+              <a:rPr lang="en-US"/>
               <a:t>Second level</a:t>
             </a:r>
           </a:p>
           <a:p>
             <a:pPr lvl="2"/>
             <a:r>
-              <a:rPr lang="en-US" smtClean="0"/>
+              <a:rPr lang="en-US"/>
               <a:t>Third level</a:t>
             </a:r>
           </a:p>
           <a:p>
             <a:pPr lvl="3"/>
             <a:r>
-              <a:rPr lang="en-US" smtClean="0"/>
+              <a:rPr lang="en-US"/>
               <a:t>Fourth level</a:t>
             </a:r>
           </a:p>
           <a:p>
             <a:pPr lvl="4"/>
             <a:r>
-              <a:rPr lang="en-US" smtClean="0"/>
+              <a:rPr lang="en-US"/>
               <a:t>Fifth level</a:t>
             </a:r>
             <a:endParaRPr lang="en-US" dirty="0"/>
@@ -4102,7 +4101,7 @@
           </a:lstStyle>
           <a:p>
             <a:r>
-              <a:rPr lang="en-US" smtClean="0"/>
+              <a:rPr lang="en-US"/>
               <a:t>Click to edit Master title style</a:t>
             </a:r>
             <a:endParaRPr lang="en-US" dirty="0"/>
@@ -4220,7 +4219,7 @@
           <a:p>
             <a:pPr lvl="0"/>
             <a:r>
-              <a:rPr lang="en-US" smtClean="0"/>
+              <a:rPr lang="en-US"/>
               <a:t>Click to edit Master text styles</a:t>
             </a:r>
           </a:p>
@@ -4345,7 +4344,7 @@
           <a:lstStyle/>
           <a:p>
             <a:r>
-              <a:rPr lang="en-US" smtClean="0"/>
+              <a:rPr lang="en-US"/>
               <a:t>Click to edit Master title style</a:t>
             </a:r>
             <a:endParaRPr lang="en-US" dirty="0"/>
@@ -4376,35 +4375,35 @@
           <a:p>
             <a:pPr lvl="0"/>
             <a:r>
-              <a:rPr lang="en-US" smtClean="0"/>
+              <a:rPr lang="en-US"/>
               <a:t>Click to edit Master text styles</a:t>
             </a:r>
           </a:p>
           <a:p>
             <a:pPr lvl="1"/>
             <a:r>
-              <a:rPr lang="en-US" smtClean="0"/>
+              <a:rPr lang="en-US"/>
               <a:t>Second level</a:t>
             </a:r>
           </a:p>
           <a:p>
             <a:pPr lvl="2"/>
             <a:r>
-              <a:rPr lang="en-US" smtClean="0"/>
+              <a:rPr lang="en-US"/>
               <a:t>Third level</a:t>
             </a:r>
           </a:p>
           <a:p>
             <a:pPr lvl="3"/>
             <a:r>
-              <a:rPr lang="en-US" smtClean="0"/>
+              <a:rPr lang="en-US"/>
               <a:t>Fourth level</a:t>
             </a:r>
           </a:p>
           <a:p>
             <a:pPr lvl="4"/>
             <a:r>
-              <a:rPr lang="en-US" smtClean="0"/>
+              <a:rPr lang="en-US"/>
               <a:t>Fifth level</a:t>
             </a:r>
             <a:endParaRPr lang="en-US" dirty="0"/>
@@ -4435,35 +4434,35 @@
           <a:p>
             <a:pPr lvl="0"/>
             <a:r>
-              <a:rPr lang="en-US" smtClean="0"/>
+              <a:rPr lang="en-US"/>
               <a:t>Click to edit Master text styles</a:t>
             </a:r>
           </a:p>
           <a:p>
             <a:pPr lvl="1"/>
             <a:r>
-              <a:rPr lang="en-US" smtClean="0"/>
+              <a:rPr lang="en-US"/>
               <a:t>Second level</a:t>
             </a:r>
           </a:p>
           <a:p>
             <a:pPr lvl="2"/>
             <a:r>
-              <a:rPr lang="en-US" smtClean="0"/>
+              <a:rPr lang="en-US"/>
               <a:t>Third level</a:t>
             </a:r>
           </a:p>
           <a:p>
             <a:pPr lvl="3"/>
             <a:r>
-              <a:rPr lang="en-US" smtClean="0"/>
+              <a:rPr lang="en-US"/>
               <a:t>Fourth level</a:t>
             </a:r>
           </a:p>
           <a:p>
             <a:pPr lvl="4"/>
             <a:r>
-              <a:rPr lang="en-US" smtClean="0"/>
+              <a:rPr lang="en-US"/>
               <a:t>Fifth level</a:t>
             </a:r>
             <a:endParaRPr lang="en-US" dirty="0"/>
@@ -4653,7 +4652,7 @@
           </a:lstStyle>
           <a:p>
             <a:r>
-              <a:rPr lang="en-US" smtClean="0"/>
+              <a:rPr lang="en-US"/>
               <a:t>Click to edit Master title style</a:t>
             </a:r>
             <a:endParaRPr lang="en-US" dirty="0"/>
@@ -4721,7 +4720,7 @@
           <a:p>
             <a:pPr lvl="0"/>
             <a:r>
-              <a:rPr lang="en-US" smtClean="0"/>
+              <a:rPr lang="en-US"/>
               <a:t>Click to edit Master text styles</a:t>
             </a:r>
           </a:p>
@@ -4767,35 +4766,35 @@
           <a:p>
             <a:pPr lvl="0"/>
             <a:r>
-              <a:rPr lang="en-US" smtClean="0"/>
+              <a:rPr lang="en-US"/>
               <a:t>Click to edit Master text styles</a:t>
             </a:r>
           </a:p>
           <a:p>
             <a:pPr lvl="1"/>
             <a:r>
-              <a:rPr lang="en-US" smtClean="0"/>
+              <a:rPr lang="en-US"/>
               <a:t>Second level</a:t>
             </a:r>
           </a:p>
           <a:p>
             <a:pPr lvl="2"/>
             <a:r>
-              <a:rPr lang="en-US" smtClean="0"/>
+              <a:rPr lang="en-US"/>
               <a:t>Third level</a:t>
             </a:r>
           </a:p>
           <a:p>
             <a:pPr lvl="3"/>
             <a:r>
-              <a:rPr lang="en-US" smtClean="0"/>
+              <a:rPr lang="en-US"/>
               <a:t>Fourth level</a:t>
             </a:r>
           </a:p>
           <a:p>
             <a:pPr lvl="4"/>
             <a:r>
-              <a:rPr lang="en-US" smtClean="0"/>
+              <a:rPr lang="en-US"/>
               <a:t>Fifth level</a:t>
             </a:r>
             <a:endParaRPr lang="en-US" dirty="0"/>
@@ -4863,7 +4862,7 @@
           <a:p>
             <a:pPr lvl="0"/>
             <a:r>
-              <a:rPr lang="en-US" smtClean="0"/>
+              <a:rPr lang="en-US"/>
               <a:t>Click to edit Master text styles</a:t>
             </a:r>
           </a:p>
@@ -4909,35 +4908,35 @@
           <a:p>
             <a:pPr lvl="0"/>
             <a:r>
-              <a:rPr lang="en-US" smtClean="0"/>
+              <a:rPr lang="en-US"/>
               <a:t>Click to edit Master text styles</a:t>
             </a:r>
           </a:p>
           <a:p>
             <a:pPr lvl="1"/>
             <a:r>
-              <a:rPr lang="en-US" smtClean="0"/>
+              <a:rPr lang="en-US"/>
               <a:t>Second level</a:t>
             </a:r>
           </a:p>
           <a:p>
             <a:pPr lvl="2"/>
             <a:r>
-              <a:rPr lang="en-US" smtClean="0"/>
+              <a:rPr lang="en-US"/>
               <a:t>Third level</a:t>
             </a:r>
           </a:p>
           <a:p>
             <a:pPr lvl="3"/>
             <a:r>
-              <a:rPr lang="en-US" smtClean="0"/>
+              <a:rPr lang="en-US"/>
               <a:t>Fourth level</a:t>
             </a:r>
           </a:p>
           <a:p>
             <a:pPr lvl="4"/>
             <a:r>
-              <a:rPr lang="en-US" smtClean="0"/>
+              <a:rPr lang="en-US"/>
               <a:t>Fifth level</a:t>
             </a:r>
             <a:endParaRPr lang="en-US" dirty="0"/>
@@ -5063,7 +5062,7 @@
           <a:lstStyle/>
           <a:p>
             <a:r>
-              <a:rPr lang="en-US" smtClean="0"/>
+              <a:rPr lang="en-US"/>
               <a:t>Click to edit Master title style</a:t>
             </a:r>
             <a:endParaRPr lang="en-US" dirty="0"/>
@@ -5303,7 +5302,7 @@
           </a:lstStyle>
           <a:p>
             <a:r>
-              <a:rPr lang="en-US" smtClean="0"/>
+              <a:rPr lang="en-US"/>
               <a:t>Click to edit Master title style</a:t>
             </a:r>
             <a:endParaRPr lang="en-US" dirty="0"/>
@@ -5334,35 +5333,35 @@
           <a:p>
             <a:pPr lvl="0"/>
             <a:r>
-              <a:rPr lang="en-US" smtClean="0"/>
+              <a:rPr lang="en-US"/>
               <a:t>Click to edit Master text styles</a:t>
             </a:r>
           </a:p>
           <a:p>
             <a:pPr lvl="1"/>
             <a:r>
-              <a:rPr lang="en-US" smtClean="0"/>
+              <a:rPr lang="en-US"/>
               <a:t>Second level</a:t>
             </a:r>
           </a:p>
           <a:p>
             <a:pPr lvl="2"/>
             <a:r>
-              <a:rPr lang="en-US" smtClean="0"/>
+              <a:rPr lang="en-US"/>
               <a:t>Third level</a:t>
             </a:r>
           </a:p>
           <a:p>
             <a:pPr lvl="3"/>
             <a:r>
-              <a:rPr lang="en-US" smtClean="0"/>
+              <a:rPr lang="en-US"/>
               <a:t>Fourth level</a:t>
             </a:r>
           </a:p>
           <a:p>
             <a:pPr lvl="4"/>
             <a:r>
-              <a:rPr lang="en-US" smtClean="0"/>
+              <a:rPr lang="en-US"/>
               <a:t>Fifth level</a:t>
             </a:r>
             <a:endParaRPr lang="en-US" dirty="0"/>
@@ -5430,7 +5429,7 @@
           <a:p>
             <a:pPr lvl="0"/>
             <a:r>
-              <a:rPr lang="en-US" smtClean="0"/>
+              <a:rPr lang="en-US"/>
               <a:t>Click to edit Master text styles</a:t>
             </a:r>
           </a:p>
@@ -5596,7 +5595,7 @@
           </a:lstStyle>
           <a:p>
             <a:r>
-              <a:rPr lang="en-US" smtClean="0"/>
+              <a:rPr lang="en-US"/>
               <a:t>Click to edit Master title style</a:t>
             </a:r>
             <a:endParaRPr lang="en-US" dirty="0"/>
@@ -5670,7 +5669,7 @@
           </a:lstStyle>
           <a:p>
             <a:r>
-              <a:rPr lang="en-US" smtClean="0"/>
+              <a:rPr lang="en-US"/>
               <a:t>Click icon to add picture</a:t>
             </a:r>
             <a:endParaRPr lang="en-US" dirty="0"/>
@@ -5738,7 +5737,7 @@
           <a:p>
             <a:pPr lvl="0"/>
             <a:r>
-              <a:rPr lang="en-US" smtClean="0"/>
+              <a:rPr lang="en-US"/>
               <a:t>Click to edit Master text styles</a:t>
             </a:r>
           </a:p>
@@ -5885,7 +5884,7 @@
           <a:lstStyle/>
           <a:p>
             <a:r>
-              <a:rPr lang="en-US" smtClean="0"/>
+              <a:rPr lang="en-US"/>
               <a:t>Click to edit Master title style</a:t>
             </a:r>
             <a:endParaRPr lang="en-US" dirty="0"/>
@@ -5926,35 +5925,35 @@
           <a:p>
             <a:pPr lvl="0"/>
             <a:r>
-              <a:rPr lang="en-US" smtClean="0"/>
+              <a:rPr lang="en-US"/>
               <a:t>Click to edit Master text styles</a:t>
             </a:r>
           </a:p>
           <a:p>
             <a:pPr lvl="1"/>
             <a:r>
-              <a:rPr lang="en-US" smtClean="0"/>
+              <a:rPr lang="en-US"/>
               <a:t>Second level</a:t>
             </a:r>
           </a:p>
           <a:p>
             <a:pPr lvl="2"/>
             <a:r>
-              <a:rPr lang="en-US" smtClean="0"/>
+              <a:rPr lang="en-US"/>
               <a:t>Third level</a:t>
             </a:r>
           </a:p>
           <a:p>
             <a:pPr lvl="3"/>
             <a:r>
-              <a:rPr lang="en-US" smtClean="0"/>
+              <a:rPr lang="en-US"/>
               <a:t>Fourth level</a:t>
             </a:r>
           </a:p>
           <a:p>
             <a:pPr lvl="4"/>
             <a:r>
-              <a:rPr lang="en-US" smtClean="0"/>
+              <a:rPr lang="en-US"/>
               <a:t>Fifth level</a:t>
             </a:r>
             <a:endParaRPr lang="en-US" dirty="0"/>
@@ -6701,17 +6700,16 @@
           <a:lstStyle/>
           <a:p>
             <a:r>
-              <a:rPr lang="en-US" dirty="0" smtClean="0"/>
+              <a:rPr lang="en-US" dirty="0"/>
               <a:t>CS4710: Artificial Intelligence</a:t>
             </a:r>
             <a:br>
-              <a:rPr lang="en-US" dirty="0" smtClean="0"/>
+              <a:rPr lang="en-US" dirty="0"/>
             </a:br>
             <a:r>
-              <a:rPr lang="en-US" dirty="0" smtClean="0"/>
+              <a:rPr lang="en-US" dirty="0"/>
               <a:t>Knowledge Representation</a:t>
             </a:r>
-            <a:endParaRPr lang="en-US" dirty="0"/>
           </a:p>
         </p:txBody>
       </p:sp>
@@ -6731,10 +6729,9 @@
           <a:lstStyle/>
           <a:p>
             <a:r>
-              <a:rPr lang="en-US" dirty="0" smtClean="0"/>
+              <a:rPr lang="en-US" dirty="0"/>
               <a:t>For most AI problems, we must represent complex information. What are some techniques for doing this? What are the pros and cons of each?</a:t>
             </a:r>
-            <a:endParaRPr lang="en-US" dirty="0"/>
           </a:p>
         </p:txBody>
       </p:sp>
@@ -6748,13 +6745,6 @@
   <p:clrMapOvr>
     <a:masterClrMapping/>
   </p:clrMapOvr>
-  <p:timing>
-    <p:tnLst>
-      <p:par>
-        <p:cTn id="1" dur="indefinite" restart="never" nodeType="tmRoot"/>
-      </p:par>
-    </p:tnLst>
-  </p:timing>
 </p:sld>
 </file>
 
@@ -6803,7 +6793,7 @@
               <a:buNone/>
             </a:pPr>
             <a:r>
-              <a:rPr lang="en-US" dirty="0" smtClean="0"/>
+              <a:rPr lang="en-US" dirty="0"/>
               <a:t>Thus in solving problems in AI we must represent knowledge and there are two entities to deal with:</a:t>
             </a:r>
           </a:p>
@@ -6813,7 +6803,7 @@
                 <a:spcPct val="90000"/>
               </a:lnSpc>
             </a:pPr>
-            <a:endParaRPr lang="en-US" b="1" dirty="0" smtClean="0"/>
+            <a:endParaRPr lang="en-US" b="1" dirty="0"/>
           </a:p>
           <a:p>
             <a:pPr eaLnBrk="1" hangingPunct="1">
@@ -6822,10 +6812,10 @@
               </a:lnSpc>
             </a:pPr>
             <a:r>
-              <a:rPr lang="en-US" b="1" dirty="0" smtClean="0"/>
+              <a:rPr lang="en-US" b="1" dirty="0"/>
               <a:t>Facts</a:t>
             </a:r>
-            <a:endParaRPr lang="en-US" dirty="0" smtClean="0"/>
+            <a:endParaRPr lang="en-US" dirty="0"/>
           </a:p>
           <a:p>
             <a:pPr lvl="1" eaLnBrk="1" hangingPunct="1">
@@ -6834,11 +6824,11 @@
               </a:lnSpc>
             </a:pPr>
             <a:r>
-              <a:rPr lang="en-US" dirty="0" smtClean="0"/>
+              <a:rPr lang="en-US" dirty="0"/>
               <a:t>-- truths about the real world and what we represent. This can be regarded as the </a:t>
             </a:r>
             <a:r>
-              <a:rPr lang="en-US" i="1" dirty="0" smtClean="0"/>
+              <a:rPr lang="en-US" i="1" dirty="0"/>
               <a:t>knowledge level</a:t>
             </a:r>
           </a:p>
@@ -6849,14 +6839,14 @@
               </a:lnSpc>
             </a:pPr>
             <a:r>
-              <a:rPr lang="en-US" i="1" dirty="0" err="1" smtClean="0"/>
+              <a:rPr lang="en-US" i="1" dirty="0" err="1"/>
               <a:t>E.g</a:t>
             </a:r>
             <a:r>
-              <a:rPr lang="en-US" i="1" dirty="0" smtClean="0"/>
+              <a:rPr lang="en-US" i="1" dirty="0"/>
               <a:t>, Floryan loves ice cream</a:t>
             </a:r>
-            <a:endParaRPr lang="en-US" dirty="0" smtClean="0"/>
+            <a:endParaRPr lang="en-US" dirty="0"/>
           </a:p>
           <a:p>
             <a:pPr eaLnBrk="1" hangingPunct="1">
@@ -6864,7 +6854,7 @@
                 <a:spcPct val="90000"/>
               </a:lnSpc>
             </a:pPr>
-            <a:endParaRPr lang="en-US" b="1" dirty="0" smtClean="0"/>
+            <a:endParaRPr lang="en-US" b="1" dirty="0"/>
           </a:p>
           <a:p>
             <a:pPr eaLnBrk="1" hangingPunct="1">
@@ -6873,10 +6863,10 @@
               </a:lnSpc>
             </a:pPr>
             <a:r>
-              <a:rPr lang="en-US" b="1" dirty="0" smtClean="0"/>
+              <a:rPr lang="en-US" b="1" dirty="0"/>
               <a:t>Representation of the facts</a:t>
             </a:r>
-            <a:endParaRPr lang="en-US" dirty="0" smtClean="0"/>
+            <a:endParaRPr lang="en-US" dirty="0"/>
           </a:p>
           <a:p>
             <a:pPr lvl="1" eaLnBrk="1" hangingPunct="1">
@@ -6885,15 +6875,15 @@
               </a:lnSpc>
             </a:pPr>
             <a:r>
-              <a:rPr lang="en-US" dirty="0" smtClean="0"/>
+              <a:rPr lang="en-US" dirty="0"/>
               <a:t>which we manipulate. This can be regarded as the </a:t>
             </a:r>
             <a:r>
-              <a:rPr lang="en-US" i="1" dirty="0" smtClean="0"/>
+              <a:rPr lang="en-US" i="1" dirty="0"/>
               <a:t>symbol level</a:t>
             </a:r>
             <a:r>
-              <a:rPr lang="en-US" dirty="0" smtClean="0"/>
+              <a:rPr lang="en-US" dirty="0"/>
               <a:t> since we usually define the representation in terms of symbols that can be manipulated by programs.</a:t>
             </a:r>
           </a:p>
@@ -6904,13 +6894,6 @@
   <p:clrMapOvr>
     <a:masterClrMapping/>
   </p:clrMapOvr>
-  <p:timing>
-    <p:tnLst>
-      <p:par>
-        <p:cTn id="1" dur="indefinite" restart="never" nodeType="tmRoot"/>
-      </p:par>
-    </p:tnLst>
-  </p:timing>
 </p:sld>
 </file>
 
@@ -6955,7 +6938,7 @@
           <a:p>
             <a:pPr algn="ctr"/>
             <a:r>
-              <a:rPr lang="en-US" b="1" dirty="0" smtClean="0"/>
+              <a:rPr lang="en-US" b="1" dirty="0"/>
               <a:t>Two Levels of Knowledge</a:t>
             </a:r>
             <a:endParaRPr lang="en-US" sz="4800" dirty="0"/>
@@ -6986,38 +6969,37 @@
           <a:p>
             <a:pPr eaLnBrk="1" hangingPunct="1"/>
             <a:r>
-              <a:rPr lang="en-US" b="1" dirty="0" smtClean="0"/>
+              <a:rPr lang="en-US" b="1" dirty="0"/>
               <a:t>Knowledge Level:</a:t>
             </a:r>
           </a:p>
           <a:p>
             <a:pPr lvl="1"/>
             <a:r>
-              <a:rPr lang="en-US" sz="2000" dirty="0" smtClean="0"/>
+              <a:rPr lang="en-US" sz="2000" dirty="0"/>
               <a:t>At which facts are described</a:t>
             </a:r>
           </a:p>
           <a:p>
             <a:pPr lvl="1"/>
             <a:r>
-              <a:rPr lang="en-US" sz="2000" i="1" dirty="0" smtClean="0"/>
+              <a:rPr lang="en-US" sz="2000" i="1" dirty="0"/>
               <a:t>All dogs have tails</a:t>
             </a:r>
           </a:p>
           <a:p>
             <a:pPr lvl="1"/>
             <a:r>
-              <a:rPr lang="en-US" sz="2000" i="1" dirty="0" smtClean="0"/>
+              <a:rPr lang="en-US" sz="2000" i="1" dirty="0"/>
               <a:t>Fido is a dog</a:t>
             </a:r>
           </a:p>
           <a:p>
             <a:pPr lvl="1"/>
             <a:r>
-              <a:rPr lang="en-US" sz="2000" i="1" dirty="0" smtClean="0"/>
+              <a:rPr lang="en-US" sz="2000" i="1" dirty="0"/>
               <a:t>Etc…</a:t>
             </a:r>
-            <a:endParaRPr lang="en-US" sz="2000" i="1" dirty="0"/>
           </a:p>
           <a:p>
             <a:pPr lvl="1" eaLnBrk="1" hangingPunct="1">
@@ -7403,7 +7385,7 @@
           <a:p>
             <a:pPr fontAlgn="auto"/>
             <a:r>
-              <a:rPr lang="en-US" b="1" dirty="0" smtClean="0"/>
+              <a:rPr lang="en-US" b="1" dirty="0"/>
               <a:t>Symbol Level:</a:t>
             </a:r>
           </a:p>
@@ -7411,72 +7393,48 @@
             <a:pPr lvl="1"/>
             <a:r>
               <a:rPr lang="en-US" i="1" dirty="0" err="1"/>
-              <a:t>h</a:t>
-            </a:r>
-            <a:r>
-              <a:rPr lang="en-US" i="1" dirty="0" err="1" smtClean="0"/>
-              <a:t>asatail</a:t>
-            </a:r>
-            <a:r>
-              <a:rPr lang="en-US" i="1" dirty="0" smtClean="0"/>
+              <a:t>hasatail</a:t>
+            </a:r>
+            <a:r>
+              <a:rPr lang="en-US" i="1" dirty="0"/>
               <a:t>(x) means ‘x’ has a tail</a:t>
             </a:r>
           </a:p>
           <a:p>
             <a:pPr lvl="1"/>
             <a:r>
-              <a:rPr lang="en-US" i="1" dirty="0" smtClean="0"/>
-              <a:t>D </a:t>
-            </a:r>
-            <a:r>
               <a:rPr lang="en-US" i="1" dirty="0"/>
-              <a:t>is a dog</a:t>
+              <a:t>D is a dog</a:t>
             </a:r>
             <a:r>
               <a:rPr lang="en-US" dirty="0"/>
               <a:t> as </a:t>
             </a:r>
             <a:r>
-              <a:rPr lang="en-US" i="1" dirty="0" smtClean="0"/>
-              <a:t>dog(D)</a:t>
-            </a:r>
-            <a:r>
               <a:rPr lang="en-US" i="1" dirty="0"/>
-              <a:t> </a:t>
+              <a:t>dog(D) </a:t>
             </a:r>
             <a:r>
               <a:rPr lang="en-US" dirty="0"/>
-              <a:t>We could then infer that all dogs have tails </a:t>
-            </a:r>
-            <a:r>
-              <a:rPr lang="en-US" dirty="0" smtClean="0"/>
-              <a:t>with:</a:t>
+              <a:t>We could then infer that all dogs have tails with:</a:t>
             </a:r>
           </a:p>
           <a:p>
             <a:pPr lvl="1"/>
             <a:r>
               <a:rPr lang="en-US" i="1" dirty="0"/>
-              <a:t>d</a:t>
-            </a:r>
-            <a:r>
-              <a:rPr lang="en-US" i="1" dirty="0" smtClean="0"/>
-              <a:t>og(Spot)</a:t>
+              <a:t>dog(Spot)</a:t>
             </a:r>
           </a:p>
           <a:p>
             <a:pPr lvl="1"/>
             <a:r>
-              <a:rPr lang="en-US" dirty="0" err="1" smtClean="0"/>
+              <a:rPr lang="en-US" dirty="0" err="1"/>
               <a:t>Vx</a:t>
             </a:r>
             <a:r>
-              <a:rPr lang="en-US" dirty="0" smtClean="0"/>
-              <a:t> </a:t>
-            </a:r>
-            <a:r>
               <a:rPr lang="en-US" dirty="0"/>
-              <a:t>: </a:t>
+              <a:t> : </a:t>
             </a:r>
             <a:r>
               <a:rPr lang="en-US" i="1" dirty="0"/>
@@ -7502,21 +7460,17 @@
             </a:r>
             <a:r>
               <a:rPr lang="en-US" dirty="0"/>
-              <a:t> We can then </a:t>
-            </a:r>
-            <a:r>
-              <a:rPr lang="en-US" dirty="0" smtClean="0"/>
-              <a:t>deduce:</a:t>
+              <a:t> We can then deduce:</a:t>
             </a:r>
           </a:p>
           <a:p>
             <a:pPr lvl="2"/>
             <a:r>
-              <a:rPr lang="en-US" i="1" dirty="0" err="1" smtClean="0"/>
+              <a:rPr lang="en-US" i="1" dirty="0" err="1"/>
               <a:t>hasatail</a:t>
             </a:r>
             <a:r>
-              <a:rPr lang="en-US" i="1" dirty="0" smtClean="0"/>
+              <a:rPr lang="en-US" i="1" dirty="0"/>
               <a:t>(Spot)</a:t>
             </a:r>
           </a:p>
@@ -7527,14 +7481,13 @@
           <a:p>
             <a:pPr lvl="1"/>
             <a:r>
-              <a:rPr lang="en-US" i="1" dirty="0" smtClean="0"/>
+              <a:rPr lang="en-US" i="1" dirty="0"/>
               <a:t>* Doesn’t have to be first-order logic as above. This is just an example</a:t>
             </a:r>
-            <a:endParaRPr lang="en-US" i="1" dirty="0"/>
           </a:p>
           <a:p>
             <a:pPr lvl="1" fontAlgn="auto"/>
-            <a:endParaRPr lang="en-US" sz="1800" dirty="0" smtClean="0"/>
+            <a:endParaRPr lang="en-US" sz="1800" dirty="0"/>
           </a:p>
           <a:p>
             <a:pPr lvl="1" fontAlgn="auto">
@@ -7555,13 +7508,6 @@
   <p:clrMapOvr>
     <a:masterClrMapping/>
   </p:clrMapOvr>
-  <p:timing>
-    <p:tnLst>
-      <p:par>
-        <p:cTn id="1" dur="indefinite" restart="never" nodeType="tmRoot"/>
-      </p:par>
-    </p:tnLst>
-  </p:timing>
 </p:sld>
 </file>
 
@@ -7605,20 +7551,12 @@
           <a:lstStyle/>
           <a:p>
             <a:pPr eaLnBrk="1" hangingPunct="1"/>
-            <a:r>
-              <a:rPr lang="en-US" b="1" dirty="0"/>
-              <a:t/>
-            </a:r>
             <a:br>
               <a:rPr lang="en-US" b="1" dirty="0"/>
             </a:br>
             <a:r>
               <a:rPr lang="en-US" b="1" dirty="0"/>
               <a:t>Properties for Knowledge Representation Systems</a:t>
-            </a:r>
-            <a:r>
-              <a:rPr lang="en-US" dirty="0"/>
-              <a:t/>
             </a:r>
             <a:br>
               <a:rPr lang="en-US" dirty="0"/>
@@ -7655,12 +7593,8 @@
               </a:lnSpc>
             </a:pPr>
             <a:r>
-              <a:rPr lang="en-US" sz="2400" b="1" dirty="0" smtClean="0"/>
-              <a:t>Representational </a:t>
-            </a:r>
-            <a:r>
               <a:rPr lang="en-US" sz="2400" b="1" dirty="0"/>
-              <a:t>Adequacy</a:t>
+              <a:t>Representational Adequacy</a:t>
             </a:r>
             <a:endParaRPr lang="en-US" sz="2400" dirty="0"/>
           </a:p>
@@ -7766,15 +7700,7 @@
             </a:pPr>
             <a:r>
               <a:rPr lang="en-US" sz="2400" dirty="0"/>
-              <a:t>To date no single system </a:t>
-            </a:r>
-            <a:r>
-              <a:rPr lang="en-US" sz="2400" dirty="0" smtClean="0"/>
-              <a:t>optimizes </a:t>
-            </a:r>
-            <a:r>
-              <a:rPr lang="en-US" sz="2400" dirty="0"/>
-              <a:t>all of the above</a:t>
+              <a:t>To date no single system optimizes all of the above</a:t>
             </a:r>
           </a:p>
         </p:txBody>
@@ -7789,13 +7715,6 @@
   <p:clrMapOvr>
     <a:masterClrMapping/>
   </p:clrMapOvr>
-  <p:timing>
-    <p:tnLst>
-      <p:par>
-        <p:cTn id="1" dur="indefinite" restart="never" nodeType="tmRoot"/>
-      </p:par>
-    </p:tnLst>
-  </p:timing>
 </p:sld>
 </file>
 
@@ -7855,11 +7774,7 @@
             </a:pPr>
             <a:r>
               <a:rPr lang="en-US" sz="2000" dirty="0"/>
-              <a:t>-- the ability to represent the required knowledge</a:t>
-            </a:r>
-            <a:r>
-              <a:rPr lang="en-US" sz="2000" dirty="0" smtClean="0"/>
-              <a:t>;</a:t>
+              <a:t>-- the ability to represent the required knowledge;</a:t>
             </a:r>
           </a:p>
           <a:p>
@@ -7876,7 +7791,7 @@
                 <a:spcPct val="80000"/>
               </a:lnSpc>
             </a:pPr>
-            <a:endParaRPr lang="en-US" sz="2000" dirty="0" smtClean="0"/>
+            <a:endParaRPr lang="en-US" sz="2000" dirty="0"/>
           </a:p>
           <a:p>
             <a:pPr>
@@ -7885,7 +7800,7 @@
               </a:lnSpc>
             </a:pPr>
             <a:r>
-              <a:rPr lang="en-US" sz="2200" dirty="0" smtClean="0"/>
+              <a:rPr lang="en-US" sz="2200" dirty="0"/>
               <a:t>What it means:</a:t>
             </a:r>
           </a:p>
@@ -7896,7 +7811,7 @@
               </a:lnSpc>
             </a:pPr>
             <a:r>
-              <a:rPr lang="en-US" dirty="0" smtClean="0"/>
+              <a:rPr lang="en-US" dirty="0"/>
               <a:t>Need a way to represent ALL types of knowledge.</a:t>
             </a:r>
           </a:p>
@@ -7907,7 +7822,7 @@
               </a:lnSpc>
             </a:pPr>
             <a:r>
-              <a:rPr lang="en-US" dirty="0" smtClean="0"/>
+              <a:rPr lang="en-US" dirty="0"/>
               <a:t>Easy:</a:t>
             </a:r>
           </a:p>
@@ -7918,7 +7833,7 @@
               </a:lnSpc>
             </a:pPr>
             <a:r>
-              <a:rPr lang="en-US" dirty="0" smtClean="0"/>
+              <a:rPr lang="en-US" dirty="0"/>
               <a:t>Spot is a dog, all dogs have tails</a:t>
             </a:r>
           </a:p>
@@ -7929,7 +7844,7 @@
               </a:lnSpc>
             </a:pPr>
             <a:r>
-              <a:rPr lang="en-US" dirty="0" smtClean="0"/>
+              <a:rPr lang="en-US" dirty="0"/>
               <a:t>Medium:</a:t>
             </a:r>
           </a:p>
@@ -7940,7 +7855,7 @@
               </a:lnSpc>
             </a:pPr>
             <a:r>
-              <a:rPr lang="en-US" dirty="0" smtClean="0"/>
+              <a:rPr lang="en-US" dirty="0"/>
               <a:t>Spot does not have a tail (apparent contradiction)</a:t>
             </a:r>
           </a:p>
@@ -7951,7 +7866,7 @@
               </a:lnSpc>
             </a:pPr>
             <a:r>
-              <a:rPr lang="en-US" dirty="0" smtClean="0"/>
+              <a:rPr lang="en-US" dirty="0"/>
               <a:t>A Little Harder:</a:t>
             </a:r>
           </a:p>
@@ -7962,10 +7877,9 @@
               </a:lnSpc>
             </a:pPr>
             <a:r>
-              <a:rPr lang="en-US" dirty="0" smtClean="0"/>
+              <a:rPr lang="en-US" dirty="0"/>
               <a:t>I must go grocery shopping between 8 and 2 on Tuesdays.</a:t>
             </a:r>
-            <a:endParaRPr lang="en-US" dirty="0"/>
           </a:p>
         </p:txBody>
       </p:sp>
@@ -8020,13 +7934,6 @@
   <p:clrMapOvr>
     <a:masterClrMapping/>
   </p:clrMapOvr>
-  <p:timing>
-    <p:tnLst>
-      <p:par>
-        <p:cTn id="1" dur="indefinite" restart="never" nodeType="tmRoot"/>
-      </p:par>
-    </p:tnLst>
-  </p:timing>
 </p:sld>
 </file>
 
@@ -8095,7 +8002,7 @@
                 <a:spcPct val="80000"/>
               </a:lnSpc>
             </a:pPr>
-            <a:endParaRPr lang="en-US" sz="2000" dirty="0" smtClean="0"/>
+            <a:endParaRPr lang="en-US" sz="2000" dirty="0"/>
           </a:p>
           <a:p>
             <a:pPr>
@@ -8104,7 +8011,7 @@
               </a:lnSpc>
             </a:pPr>
             <a:r>
-              <a:rPr lang="en-US" sz="2200" dirty="0" smtClean="0"/>
+              <a:rPr lang="en-US" sz="2200" dirty="0"/>
               <a:t>What it means:</a:t>
             </a:r>
           </a:p>
@@ -8115,7 +8022,7 @@
               </a:lnSpc>
             </a:pPr>
             <a:r>
-              <a:rPr lang="en-US" dirty="0" smtClean="0"/>
+              <a:rPr lang="en-US" dirty="0"/>
               <a:t>In formal logic, this means applying logical reasoning to infer new things.</a:t>
             </a:r>
           </a:p>
@@ -8126,7 +8033,7 @@
               </a:lnSpc>
             </a:pPr>
             <a:r>
-              <a:rPr lang="en-US" dirty="0" smtClean="0"/>
+              <a:rPr lang="en-US" dirty="0"/>
               <a:t>Spot is a dog</a:t>
             </a:r>
           </a:p>
@@ -8137,7 +8044,7 @@
               </a:lnSpc>
             </a:pPr>
             <a:r>
-              <a:rPr lang="en-US" dirty="0" smtClean="0"/>
+              <a:rPr lang="en-US" dirty="0"/>
               <a:t>All dogs have tails</a:t>
             </a:r>
           </a:p>
@@ -8148,7 +8055,7 @@
               </a:lnSpc>
             </a:pPr>
             <a:r>
-              <a:rPr lang="en-US" dirty="0" smtClean="0"/>
+              <a:rPr lang="en-US" dirty="0"/>
               <a:t>Thus, Spot has a tail</a:t>
             </a:r>
           </a:p>
@@ -8166,7 +8073,7 @@
                 <a:spcPct val="80000"/>
               </a:lnSpc>
             </a:pPr>
-            <a:endParaRPr lang="en-US" dirty="0" smtClean="0"/>
+            <a:endParaRPr lang="en-US" dirty="0"/>
           </a:p>
           <a:p>
             <a:pPr>
@@ -8175,7 +8082,7 @@
               </a:lnSpc>
             </a:pPr>
             <a:r>
-              <a:rPr lang="en-US" dirty="0" smtClean="0"/>
+              <a:rPr lang="en-US" dirty="0"/>
               <a:t>If we can represent knowledge, but can’t use it to infer anything interesting, then our representation is quite poor.</a:t>
             </a:r>
           </a:p>
@@ -8232,13 +8139,6 @@
   <p:clrMapOvr>
     <a:masterClrMapping/>
   </p:clrMapOvr>
-  <p:timing>
-    <p:tnLst>
-      <p:par>
-        <p:cTn id="1" dur="indefinite" restart="never" nodeType="tmRoot"/>
-      </p:par>
-    </p:tnLst>
-  </p:timing>
 </p:sld>
 </file>
 
@@ -8298,13 +8198,8 @@
             </a:pPr>
             <a:r>
               <a:rPr lang="en-US" sz="2000" dirty="0"/>
-              <a:t>- the ability to direct the inferential mechanisms into the most productive directions by storing appropriate guides</a:t>
-            </a:r>
-            <a:r>
-              <a:rPr lang="en-US" sz="2000" dirty="0" smtClean="0"/>
-              <a:t>;</a:t>
-            </a:r>
-            <a:endParaRPr lang="en-US" sz="2000" dirty="0"/>
+              <a:t>- the ability to direct the inferential mechanisms into the most productive directions by storing appropriate guides;</a:t>
+            </a:r>
           </a:p>
           <a:p>
             <a:pPr lvl="1">
@@ -8312,7 +8207,7 @@
                 <a:spcPct val="80000"/>
               </a:lnSpc>
             </a:pPr>
-            <a:endParaRPr lang="en-US" sz="2000" dirty="0" smtClean="0"/>
+            <a:endParaRPr lang="en-US" sz="2000" dirty="0"/>
           </a:p>
           <a:p>
             <a:pPr>
@@ -8321,7 +8216,7 @@
               </a:lnSpc>
             </a:pPr>
             <a:r>
-              <a:rPr lang="en-US" sz="2200" dirty="0" smtClean="0"/>
+              <a:rPr lang="en-US" sz="2200" dirty="0"/>
               <a:t>What it means:</a:t>
             </a:r>
           </a:p>
@@ -8332,7 +8227,7 @@
               </a:lnSpc>
             </a:pPr>
             <a:r>
-              <a:rPr lang="en-US" dirty="0" smtClean="0"/>
+              <a:rPr lang="en-US" dirty="0"/>
               <a:t>When making complex inferences, system should do so in the most efficient manner possible.</a:t>
             </a:r>
           </a:p>
@@ -8343,7 +8238,7 @@
               </a:lnSpc>
             </a:pPr>
             <a:r>
-              <a:rPr lang="en-US" dirty="0" smtClean="0"/>
+              <a:rPr lang="en-US" dirty="0"/>
               <a:t>Basically an algorithms problem</a:t>
             </a:r>
           </a:p>
@@ -8362,10 +8257,9 @@
               </a:lnSpc>
             </a:pPr>
             <a:r>
-              <a:rPr lang="en-US" dirty="0" smtClean="0"/>
+              <a:rPr lang="en-US" dirty="0"/>
               <a:t>System should be able to choose, if many inferential paths possible, the most important or productive path!</a:t>
             </a:r>
-            <a:endParaRPr lang="en-US" dirty="0"/>
           </a:p>
         </p:txBody>
       </p:sp>
@@ -8420,13 +8314,6 @@
   <p:clrMapOvr>
     <a:masterClrMapping/>
   </p:clrMapOvr>
-  <p:timing>
-    <p:tnLst>
-      <p:par>
-        <p:cTn id="1" dur="indefinite" restart="never" nodeType="tmRoot"/>
-      </p:par>
-    </p:tnLst>
-  </p:timing>
 </p:sld>
 </file>
 
@@ -8492,7 +8379,6 @@
               <a:rPr lang="en-US" sz="2000" dirty="0"/>
               <a:t>- the ability to acquire new knowledge using automatic methods wherever possible rather than reliance on human intervention.</a:t>
             </a:r>
-            <a:endParaRPr lang="en-US" sz="2000" dirty="0" smtClean="0"/>
           </a:p>
           <a:p>
             <a:pPr lvl="1">
@@ -8508,7 +8394,7 @@
                 <a:spcPct val="80000"/>
               </a:lnSpc>
             </a:pPr>
-            <a:endParaRPr lang="en-US" sz="2000" dirty="0" smtClean="0"/>
+            <a:endParaRPr lang="en-US" sz="2000" dirty="0"/>
           </a:p>
           <a:p>
             <a:pPr>
@@ -8517,7 +8403,7 @@
               </a:lnSpc>
             </a:pPr>
             <a:r>
-              <a:rPr lang="en-US" sz="2200" dirty="0" smtClean="0"/>
+              <a:rPr lang="en-US" sz="2200" dirty="0"/>
               <a:t>What it means:</a:t>
             </a:r>
           </a:p>
@@ -8528,10 +8414,9 @@
               </a:lnSpc>
             </a:pPr>
             <a:r>
-              <a:rPr lang="en-US" dirty="0" smtClean="0"/>
+              <a:rPr lang="en-US" dirty="0"/>
               <a:t>Humans should not have to manually teach the system everything. It needs to learn on it’s own as much as possible.</a:t>
             </a:r>
-            <a:endParaRPr lang="en-US" dirty="0"/>
           </a:p>
         </p:txBody>
       </p:sp>
@@ -8586,13 +8471,6 @@
   <p:clrMapOvr>
     <a:masterClrMapping/>
   </p:clrMapOvr>
-  <p:timing>
-    <p:tnLst>
-      <p:par>
-        <p:cTn id="1" dur="indefinite" restart="never" nodeType="tmRoot"/>
-      </p:par>
-    </p:tnLst>
-  </p:timing>
 </p:sld>
 </file>
 
@@ -8635,20 +8513,12 @@
           <a:p>
             <a:pPr eaLnBrk="1" hangingPunct="1"/>
             <a:r>
-              <a:rPr lang="en-US" sz="3200" b="1" dirty="0" smtClean="0"/>
-              <a:t>Basic Approaches </a:t>
-            </a:r>
-            <a:r>
               <a:rPr lang="en-US" sz="3200" b="1" dirty="0"/>
-              <a:t>to Knowledge Representation</a:t>
+              <a:t>Basic Approaches to Knowledge Representation</a:t>
             </a:r>
             <a:br>
               <a:rPr lang="en-US" sz="3200" b="1" dirty="0"/>
             </a:br>
-            <a:r>
-              <a:rPr lang="en-US" sz="3200" dirty="0"/>
-              <a:t/>
-            </a:r>
             <a:br>
               <a:rPr lang="en-US" sz="3200" dirty="0"/>
             </a:br>
@@ -8710,7 +8580,7 @@
           <a:p>
             <a:pPr algn="ctr"/>
             <a:r>
-              <a:rPr lang="en-US" b="1" dirty="0" smtClean="0"/>
+              <a:rPr lang="en-US" b="1" dirty="0"/>
               <a:t>Two Schools of Thought</a:t>
             </a:r>
             <a:endParaRPr lang="en-US" sz="4800" dirty="0"/>
@@ -8741,32 +8611,32 @@
           <a:p>
             <a:pPr eaLnBrk="1" hangingPunct="1"/>
             <a:r>
-              <a:rPr lang="en-US" b="1" dirty="0" smtClean="0"/>
+              <a:rPr lang="en-US" b="1" dirty="0"/>
               <a:t>Knowledge as Logic:</a:t>
             </a:r>
           </a:p>
           <a:p>
             <a:pPr lvl="1"/>
             <a:r>
-              <a:rPr lang="en-US" sz="2000" dirty="0" smtClean="0"/>
+              <a:rPr lang="en-US" sz="2000" dirty="0"/>
               <a:t>E.g., Propositional Logic:</a:t>
             </a:r>
           </a:p>
           <a:p>
             <a:pPr lvl="1"/>
             <a:r>
-              <a:rPr lang="en-US" sz="2000" i="1" dirty="0" smtClean="0"/>
+              <a:rPr lang="en-US" sz="2000" i="1" dirty="0"/>
               <a:t>“If x is a cardinal, then x is red”</a:t>
             </a:r>
           </a:p>
           <a:p>
             <a:pPr lvl="1"/>
             <a:r>
-              <a:rPr lang="en-US" sz="2000" i="1" dirty="0" smtClean="0"/>
+              <a:rPr lang="en-US" sz="2000" i="1" dirty="0"/>
               <a:t>∀x(cardinal(x) </a:t>
             </a:r>
             <a:r>
-              <a:rPr lang="en-US" sz="2000" i="1" dirty="0" smtClean="0">
+              <a:rPr lang="en-US" sz="2000" i="1" dirty="0">
                 <a:sym typeface="Wingdings" panose="05000000000000000000" pitchFamily="2" charset="2"/>
               </a:rPr>
               <a:t> red(x))</a:t>
@@ -9157,39 +9027,38 @@
           <a:p>
             <a:pPr fontAlgn="auto"/>
             <a:r>
-              <a:rPr lang="en-US" b="1" dirty="0" err="1" smtClean="0"/>
+              <a:rPr lang="en-US" b="1" dirty="0" err="1"/>
               <a:t>Associationist</a:t>
             </a:r>
             <a:r>
-              <a:rPr lang="en-US" b="1" dirty="0" smtClean="0"/>
+              <a:rPr lang="en-US" b="1" dirty="0"/>
               <a:t>:</a:t>
             </a:r>
           </a:p>
           <a:p>
             <a:pPr lvl="1" fontAlgn="auto"/>
             <a:r>
-              <a:rPr lang="en-US" i="1" dirty="0" smtClean="0"/>
+              <a:rPr lang="en-US" i="1" dirty="0"/>
               <a:t>Idea that knowledge is built via observations and their associations with other observations</a:t>
             </a:r>
           </a:p>
           <a:p>
             <a:pPr lvl="1" fontAlgn="auto"/>
             <a:r>
-              <a:rPr lang="en-US" i="1" dirty="0" smtClean="0"/>
+              <a:rPr lang="en-US" i="1" dirty="0"/>
               <a:t>First cited by Plato and Aristotle</a:t>
             </a:r>
           </a:p>
           <a:p>
             <a:pPr lvl="1" fontAlgn="auto"/>
             <a:r>
-              <a:rPr lang="en-US" i="1" dirty="0" smtClean="0"/>
+              <a:rPr lang="en-US" i="1" dirty="0"/>
               <a:t>Believe that humans don’t actually think logically only</a:t>
             </a:r>
-            <a:endParaRPr lang="en-US" i="1" dirty="0"/>
           </a:p>
           <a:p>
             <a:pPr lvl="1" fontAlgn="auto"/>
-            <a:endParaRPr lang="en-US" sz="1800" dirty="0" smtClean="0"/>
+            <a:endParaRPr lang="en-US" sz="1800" dirty="0"/>
           </a:p>
           <a:p>
             <a:pPr lvl="1" fontAlgn="auto">
@@ -9335,12 +9204,8 @@
           <a:lstStyle/>
           <a:p>
             <a:r>
-              <a:rPr lang="en-GB" altLang="en-US" dirty="0" smtClean="0"/>
-              <a:t>What </a:t>
-            </a:r>
-            <a:r>
               <a:rPr lang="en-GB" altLang="en-US" dirty="0"/>
-              <a:t>is a Logic?</a:t>
+              <a:t>What is a Logic?</a:t>
             </a:r>
           </a:p>
         </p:txBody>
@@ -9519,16 +9384,16 @@
               <a:buNone/>
             </a:pPr>
             <a:r>
-              <a:rPr lang="en-US" sz="2400" b="1" dirty="0" smtClean="0"/>
+              <a:rPr lang="en-US" sz="2400" b="1" dirty="0"/>
               <a:t>Topics</a:t>
             </a:r>
           </a:p>
           <a:p>
-            <a:endParaRPr lang="en-US" dirty="0" smtClean="0"/>
-          </a:p>
-          <a:p>
-            <a:r>
-              <a:rPr lang="en-US" dirty="0" smtClean="0"/>
+            <a:endParaRPr lang="en-US" dirty="0"/>
+          </a:p>
+          <a:p>
+            <a:r>
+              <a:rPr lang="en-US" dirty="0"/>
               <a:t>Overview of Knowledge Representation</a:t>
             </a:r>
           </a:p>
@@ -9537,7 +9402,7 @@
           </a:p>
           <a:p>
             <a:r>
-              <a:rPr lang="en-US" dirty="0" smtClean="0"/>
+              <a:rPr lang="en-US" dirty="0"/>
               <a:t>What Info do we Need to Represent?</a:t>
             </a:r>
           </a:p>
@@ -9546,10 +9411,9 @@
           </a:p>
           <a:p>
             <a:r>
-              <a:rPr lang="en-US" dirty="0" smtClean="0"/>
+              <a:rPr lang="en-US" dirty="0"/>
               <a:t>Techniques for doing so…etc.</a:t>
             </a:r>
-            <a:endParaRPr lang="en-US" dirty="0"/>
           </a:p>
         </p:txBody>
       </p:sp>
@@ -9604,13 +9468,6 @@
   <p:clrMapOvr>
     <a:masterClrMapping/>
   </p:clrMapOvr>
-  <p:timing>
-    <p:tnLst>
-      <p:par>
-        <p:cTn id="1" dur="indefinite" restart="never" nodeType="tmRoot"/>
-      </p:par>
-    </p:tnLst>
-  </p:timing>
 </p:sld>
 </file>
 
@@ -9653,10 +9510,6 @@
           </a:bodyPr>
           <a:lstStyle/>
           <a:p>
-            <a:r>
-              <a:rPr lang="en-GB" altLang="en-US" dirty="0"/>
-              <a:t/>
-            </a:r>
             <a:br>
               <a:rPr lang="en-GB" altLang="en-US" dirty="0"/>
             </a:br>
@@ -9816,10 +9669,6 @@
           </a:bodyPr>
           <a:lstStyle/>
           <a:p>
-            <a:r>
-              <a:rPr lang="en-GB" altLang="en-US" dirty="0"/>
-              <a:t/>
-            </a:r>
             <a:br>
               <a:rPr lang="en-GB" altLang="en-US" dirty="0"/>
             </a:br>
@@ -9889,16 +9738,12 @@
             </a:r>
           </a:p>
           <a:p>
-            <a:endParaRPr lang="en-GB" altLang="en-US" dirty="0" smtClean="0"/>
-          </a:p>
-          <a:p>
-            <a:r>
-              <a:rPr lang="en-GB" altLang="en-US" dirty="0" smtClean="0"/>
-              <a:t>Semantics </a:t>
-            </a:r>
+            <a:endParaRPr lang="en-GB" altLang="en-US" dirty="0"/>
+          </a:p>
+          <a:p>
             <a:r>
               <a:rPr lang="en-GB" altLang="en-US" dirty="0"/>
-              <a:t>(Classical AKA Boolean)</a:t>
+              <a:t>Semantics (Classical AKA Boolean)</a:t>
             </a:r>
           </a:p>
           <a:p>
@@ -10026,12 +9871,8 @@
           <a:lstStyle/>
           <a:p>
             <a:r>
-              <a:rPr lang="en-GB" altLang="en-US" dirty="0" smtClean="0"/>
-              <a:t>Predicate </a:t>
-            </a:r>
-            <a:r>
               <a:rPr lang="en-GB" altLang="en-US" dirty="0"/>
-              <a:t>Logic</a:t>
+              <a:t>Predicate Logic</a:t>
             </a:r>
           </a:p>
         </p:txBody>
@@ -10094,20 +9935,16 @@
             </a:r>
           </a:p>
           <a:p>
-            <a:endParaRPr lang="en-GB" altLang="en-US" b="1" dirty="0" smtClean="0"/>
-          </a:p>
-          <a:p>
-            <a:r>
-              <a:rPr lang="en-GB" altLang="en-US" b="1" dirty="0" smtClean="0"/>
+            <a:endParaRPr lang="en-GB" altLang="en-US" b="1" dirty="0"/>
+          </a:p>
+          <a:p>
+            <a:r>
+              <a:rPr lang="en-GB" altLang="en-US" b="1" dirty="0"/>
               <a:t>Predicates</a:t>
             </a:r>
             <a:r>
-              <a:rPr lang="en-GB" altLang="en-US" dirty="0" smtClean="0"/>
-              <a:t> </a:t>
-            </a:r>
-            <a:r>
               <a:rPr lang="en-GB" altLang="en-US" dirty="0"/>
-              <a:t>allow us to talk about objects</a:t>
+              <a:t> allow us to talk about objects</a:t>
             </a:r>
           </a:p>
           <a:p>
@@ -10140,16 +9977,12 @@
             </a:r>
           </a:p>
           <a:p>
-            <a:endParaRPr lang="en-GB" altLang="en-US" dirty="0" smtClean="0"/>
-          </a:p>
-          <a:p>
-            <a:r>
-              <a:rPr lang="en-GB" altLang="en-US" dirty="0" smtClean="0"/>
-              <a:t>In predicate </a:t>
-            </a:r>
+            <a:endParaRPr lang="en-GB" altLang="en-US" dirty="0"/>
+          </a:p>
+          <a:p>
             <a:r>
               <a:rPr lang="en-GB" altLang="en-US" dirty="0"/>
-              <a:t>logic each atom is a predicate</a:t>
+              <a:t>In predicate logic each atom is a predicate</a:t>
             </a:r>
           </a:p>
           <a:p>
@@ -10256,7 +10089,7 @@
                 <a:spcPct val="90000"/>
               </a:lnSpc>
             </a:pPr>
-            <a:endParaRPr lang="en-GB" altLang="en-US" sz="2400" b="1" dirty="0" smtClean="0"/>
+            <a:endParaRPr lang="en-GB" altLang="en-US" sz="2400" b="1" dirty="0"/>
           </a:p>
           <a:p>
             <a:pPr>
@@ -10265,16 +10098,12 @@
               </a:lnSpc>
             </a:pPr>
             <a:r>
-              <a:rPr lang="en-GB" altLang="en-US" sz="2400" b="1" dirty="0" smtClean="0"/>
+              <a:rPr lang="en-GB" altLang="en-US" sz="2400" b="1" dirty="0"/>
               <a:t>Constants</a:t>
             </a:r>
             <a:r>
-              <a:rPr lang="en-GB" altLang="en-US" sz="2400" dirty="0" smtClean="0"/>
-              <a:t> </a:t>
-            </a:r>
-            <a:r>
               <a:rPr lang="en-GB" altLang="en-US" sz="2400" dirty="0"/>
-              <a:t>are objects: john, apples</a:t>
+              <a:t> are objects: john, apples</a:t>
             </a:r>
           </a:p>
           <a:p>
@@ -10283,7 +10112,7 @@
                 <a:spcPct val="90000"/>
               </a:lnSpc>
             </a:pPr>
-            <a:endParaRPr lang="en-GB" altLang="en-US" sz="2400" b="1" dirty="0" smtClean="0"/>
+            <a:endParaRPr lang="en-GB" altLang="en-US" sz="2400" b="1" dirty="0"/>
           </a:p>
           <a:p>
             <a:pPr>
@@ -10292,16 +10121,12 @@
               </a:lnSpc>
             </a:pPr>
             <a:r>
-              <a:rPr lang="en-GB" altLang="en-US" sz="2400" b="1" dirty="0" smtClean="0"/>
+              <a:rPr lang="en-GB" altLang="en-US" sz="2400" b="1" dirty="0"/>
               <a:t>Predicates</a:t>
             </a:r>
             <a:r>
-              <a:rPr lang="en-GB" altLang="en-US" sz="2400" dirty="0" smtClean="0"/>
-              <a:t> </a:t>
-            </a:r>
-            <a:r>
               <a:rPr lang="en-GB" altLang="en-US" sz="2400" dirty="0"/>
-              <a:t>are properties and relations:</a:t>
+              <a:t> are properties and relations:</a:t>
             </a:r>
           </a:p>
           <a:p>
@@ -10321,7 +10146,7 @@
                 <a:spcPct val="90000"/>
               </a:lnSpc>
             </a:pPr>
-            <a:endParaRPr lang="en-GB" altLang="en-US" sz="2400" b="1" dirty="0" smtClean="0"/>
+            <a:endParaRPr lang="en-GB" altLang="en-US" sz="2400" b="1" dirty="0"/>
           </a:p>
           <a:p>
             <a:pPr>
@@ -10330,16 +10155,12 @@
               </a:lnSpc>
             </a:pPr>
             <a:r>
-              <a:rPr lang="en-GB" altLang="en-US" sz="2400" b="1" dirty="0" smtClean="0"/>
+              <a:rPr lang="en-GB" altLang="en-US" sz="2400" b="1" dirty="0"/>
               <a:t>Functions</a:t>
             </a:r>
             <a:r>
-              <a:rPr lang="en-GB" altLang="en-US" sz="2400" dirty="0" smtClean="0"/>
-              <a:t> </a:t>
-            </a:r>
-            <a:r>
               <a:rPr lang="en-GB" altLang="en-US" sz="2400" dirty="0"/>
-              <a:t>transform objects:</a:t>
+              <a:t> transform objects:</a:t>
             </a:r>
           </a:p>
           <a:p>
@@ -10375,7 +10196,7 @@
                 <a:spcPct val="90000"/>
               </a:lnSpc>
             </a:pPr>
-            <a:endParaRPr lang="en-GB" altLang="en-US" sz="2400" b="1" dirty="0" smtClean="0"/>
+            <a:endParaRPr lang="en-GB" altLang="en-US" sz="2400" b="1" dirty="0"/>
           </a:p>
           <a:p>
             <a:pPr>
@@ -10384,16 +10205,12 @@
               </a:lnSpc>
             </a:pPr>
             <a:r>
-              <a:rPr lang="en-GB" altLang="en-US" sz="2400" b="1" dirty="0" smtClean="0"/>
+              <a:rPr lang="en-GB" altLang="en-US" sz="2400" b="1" dirty="0"/>
               <a:t>Variables</a:t>
             </a:r>
             <a:r>
-              <a:rPr lang="en-GB" altLang="en-US" sz="2400" dirty="0" smtClean="0"/>
-              <a:t> </a:t>
-            </a:r>
-            <a:r>
               <a:rPr lang="en-GB" altLang="en-US" sz="2400" dirty="0"/>
-              <a:t>represent any object:  likes(X, apples)</a:t>
+              <a:t> represent any object:  likes(X, apples)</a:t>
             </a:r>
           </a:p>
           <a:p>
@@ -10402,7 +10219,7 @@
                 <a:spcPct val="90000"/>
               </a:lnSpc>
             </a:pPr>
-            <a:endParaRPr lang="en-GB" altLang="en-US" sz="2400" b="1" dirty="0" smtClean="0"/>
+            <a:endParaRPr lang="en-GB" altLang="en-US" sz="2400" b="1" dirty="0"/>
           </a:p>
           <a:p>
             <a:pPr>
@@ -10411,16 +10228,12 @@
               </a:lnSpc>
             </a:pPr>
             <a:r>
-              <a:rPr lang="en-GB" altLang="en-US" sz="2400" b="1" dirty="0" smtClean="0"/>
+              <a:rPr lang="en-GB" altLang="en-US" sz="2400" b="1" dirty="0"/>
               <a:t>Quantifiers</a:t>
             </a:r>
             <a:r>
-              <a:rPr lang="en-GB" altLang="en-US" sz="2400" dirty="0" smtClean="0"/>
-              <a:t> </a:t>
-            </a:r>
-            <a:r>
               <a:rPr lang="en-GB" altLang="en-US" sz="2400" dirty="0"/>
-              <a:t>qualify values of variables</a:t>
+              <a:t> qualify values of variables</a:t>
             </a:r>
           </a:p>
           <a:p>
@@ -10515,12 +10328,8 @@
           <a:lstStyle/>
           <a:p>
             <a:r>
-              <a:rPr lang="en-GB" altLang="en-US" dirty="0" smtClean="0"/>
-              <a:t>Example</a:t>
-            </a:r>
-            <a:r>
               <a:rPr lang="en-GB" altLang="en-US" dirty="0"/>
-              <a:t>: FOL Sentence</a:t>
+              <a:t>Example: FOL Sentence</a:t>
             </a:r>
           </a:p>
         </p:txBody>
@@ -10546,22 +10355,21 @@
           <a:lstStyle/>
           <a:p>
             <a:r>
-              <a:rPr lang="en-GB" altLang="en-US" dirty="0" smtClean="0"/>
+              <a:rPr lang="en-GB" altLang="en-US" dirty="0"/>
               <a:t>What does this mean?</a:t>
             </a:r>
+          </a:p>
+          <a:p>
             <a:endParaRPr lang="en-GB" altLang="en-US" dirty="0"/>
           </a:p>
           <a:p>
             <a:endParaRPr lang="en-GB" altLang="en-US" dirty="0"/>
           </a:p>
           <a:p>
+            <a:pPr marL="36900" indent="0">
+              <a:buNone/>
+            </a:pPr>
             <a:endParaRPr lang="en-GB" altLang="en-US" dirty="0"/>
-          </a:p>
-          <a:p>
-            <a:pPr marL="36900" indent="0">
-              <a:buNone/>
-            </a:pPr>
-            <a:endParaRPr lang="en-GB" altLang="en-US" dirty="0" smtClean="0"/>
           </a:p>
         </p:txBody>
       </p:sp>
@@ -10654,12 +10462,8 @@
           <a:lstStyle/>
           <a:p>
             <a:r>
-              <a:rPr lang="en-GB" altLang="en-US" dirty="0" smtClean="0"/>
-              <a:t>Example</a:t>
-            </a:r>
-            <a:r>
               <a:rPr lang="en-GB" altLang="en-US" dirty="0"/>
-              <a:t>: FOL Sentence</a:t>
+              <a:t>Example: FOL Sentence</a:t>
             </a:r>
           </a:p>
         </p:txBody>
@@ -10696,16 +10500,12 @@
             <a:endParaRPr lang="en-GB" altLang="en-US" dirty="0"/>
           </a:p>
           <a:p>
-            <a:endParaRPr lang="en-GB" altLang="en-US" dirty="0" smtClean="0"/>
-          </a:p>
-          <a:p>
-            <a:r>
-              <a:rPr lang="en-GB" altLang="en-US" dirty="0" smtClean="0"/>
-              <a:t>For </a:t>
-            </a:r>
+            <a:endParaRPr lang="en-GB" altLang="en-US" dirty="0"/>
+          </a:p>
+          <a:p>
             <a:r>
               <a:rPr lang="en-GB" altLang="en-US" dirty="0"/>
-              <a:t>all X</a:t>
+              <a:t>For all X</a:t>
             </a:r>
           </a:p>
           <a:p>
@@ -10820,12 +10620,8 @@
           <a:lstStyle/>
           <a:p>
             <a:r>
-              <a:rPr lang="en-GB" altLang="en-US" dirty="0" smtClean="0"/>
-              <a:t>Example</a:t>
-            </a:r>
-            <a:r>
               <a:rPr lang="en-GB" altLang="en-US" dirty="0"/>
-              <a:t>: FOL Sentence</a:t>
+              <a:t>Example: FOL Sentence</a:t>
             </a:r>
           </a:p>
         </p:txBody>
@@ -10919,12 +10715,8 @@
           <a:lstStyle/>
           <a:p>
             <a:r>
-              <a:rPr lang="en-GB" altLang="en-US" dirty="0" smtClean="0"/>
-              <a:t>Example</a:t>
-            </a:r>
-            <a:r>
               <a:rPr lang="en-GB" altLang="en-US" dirty="0"/>
-              <a:t>: FOL Sentence</a:t>
+              <a:t>Example: FOL Sentence</a:t>
             </a:r>
           </a:p>
         </p:txBody>
@@ -11277,12 +11069,8 @@
           <a:lstStyle/>
           <a:p>
             <a:r>
-              <a:rPr lang="en-GB" altLang="en-US" dirty="0" smtClean="0"/>
-              <a:t>Higher </a:t>
-            </a:r>
-            <a:r>
               <a:rPr lang="en-GB" altLang="en-US" dirty="0"/>
-              <a:t>Order Logic</a:t>
+              <a:t>Higher Order Logic</a:t>
             </a:r>
           </a:p>
         </p:txBody>
@@ -11323,7 +11111,7 @@
                 <a:spcPct val="90000"/>
               </a:lnSpc>
             </a:pPr>
-            <a:endParaRPr lang="en-GB" altLang="en-US" dirty="0" smtClean="0"/>
+            <a:endParaRPr lang="en-GB" altLang="en-US" dirty="0"/>
           </a:p>
           <a:p>
             <a:pPr>
@@ -11332,12 +11120,8 @@
               </a:lnSpc>
             </a:pPr>
             <a:r>
-              <a:rPr lang="en-GB" altLang="en-US" dirty="0" smtClean="0"/>
-              <a:t>Functions </a:t>
-            </a:r>
-            <a:r>
               <a:rPr lang="en-GB" altLang="en-US" dirty="0"/>
-              <a:t>and predicates are also objects</a:t>
+              <a:t>Functions and predicates are also objects</a:t>
             </a:r>
           </a:p>
           <a:p>
@@ -11379,7 +11163,7 @@
                 <a:spcPct val="90000"/>
               </a:lnSpc>
             </a:pPr>
-            <a:endParaRPr lang="en-GB" altLang="en-US" dirty="0" smtClean="0"/>
+            <a:endParaRPr lang="en-GB" altLang="en-US" dirty="0"/>
           </a:p>
           <a:p>
             <a:pPr>
@@ -11388,12 +11172,8 @@
               </a:lnSpc>
             </a:pPr>
             <a:r>
-              <a:rPr lang="en-GB" altLang="en-US" dirty="0" smtClean="0"/>
-              <a:t>E.g</a:t>
-            </a:r>
-            <a:r>
               <a:rPr lang="en-GB" altLang="en-US" dirty="0"/>
-              <a:t>. define red functions as having zero at 17</a:t>
+              <a:t>E.g. define red functions as having zero at 17</a:t>
             </a:r>
           </a:p>
           <a:p>
@@ -11566,16 +11346,12 @@
             </a:r>
           </a:p>
           <a:p>
-            <a:endParaRPr lang="en-GB" altLang="en-US" sz="2400" dirty="0" smtClean="0"/>
-          </a:p>
-          <a:p>
-            <a:r>
-              <a:rPr lang="en-GB" altLang="en-US" sz="2400" dirty="0" smtClean="0"/>
-              <a:t>Match-resolve-act </a:t>
-            </a:r>
+            <a:endParaRPr lang="en-GB" altLang="en-US" sz="2400" dirty="0"/>
+          </a:p>
+          <a:p>
             <a:r>
               <a:rPr lang="en-GB" altLang="en-US" sz="2400" dirty="0"/>
-              <a:t>cycle</a:t>
+              <a:t>Match-resolve-act cycle</a:t>
             </a:r>
           </a:p>
           <a:p>
@@ -11642,16 +11418,12 @@
             </a:r>
           </a:p>
           <a:p>
-            <a:endParaRPr lang="en-GB" altLang="en-US" sz="2400" dirty="0" smtClean="0"/>
-          </a:p>
-          <a:p>
-            <a:r>
-              <a:rPr lang="en-GB" altLang="en-US" sz="2400" dirty="0" smtClean="0"/>
-              <a:t>Working </a:t>
-            </a:r>
+            <a:endParaRPr lang="en-GB" altLang="en-US" sz="2400" dirty="0"/>
+          </a:p>
+          <a:p>
             <a:r>
               <a:rPr lang="en-GB" altLang="en-US" sz="2400" dirty="0"/>
-              <a:t>memory:</a:t>
+              <a:t>Working memory:</a:t>
             </a:r>
           </a:p>
           <a:p>
@@ -11722,20 +11494,12 @@
           <a:p>
             <a:pPr eaLnBrk="1" hangingPunct="1"/>
             <a:r>
-              <a:rPr lang="en-US" sz="3200" b="1" dirty="0" smtClean="0"/>
+              <a:rPr lang="en-US" sz="3200" b="1" dirty="0"/>
               <a:t>Physical Symbol Systems and the beginning of AI</a:t>
-            </a:r>
-            <a:r>
-              <a:rPr lang="en-US" sz="3200" b="1" dirty="0"/>
-              <a:t/>
             </a:r>
             <a:br>
               <a:rPr lang="en-US" sz="3200" b="1" dirty="0"/>
             </a:br>
-            <a:r>
-              <a:rPr lang="en-US" sz="3200" dirty="0"/>
-              <a:t/>
-            </a:r>
             <a:br>
               <a:rPr lang="en-US" sz="3200" dirty="0"/>
             </a:br>
@@ -11927,12 +11691,8 @@
           <a:lstStyle/>
           <a:p>
             <a:r>
-              <a:rPr lang="en-GB" altLang="en-US" dirty="0" smtClean="0"/>
-              <a:t>Beyond </a:t>
-            </a:r>
-            <a:r>
               <a:rPr lang="en-GB" altLang="en-US" dirty="0"/>
-              <a:t>True and False</a:t>
+              <a:t>Beyond True and False</a:t>
             </a:r>
           </a:p>
         </p:txBody>
@@ -11988,7 +11748,7 @@
             </a:r>
           </a:p>
           <a:p>
-            <a:endParaRPr lang="en-GB" altLang="en-US" dirty="0" smtClean="0"/>
+            <a:endParaRPr lang="en-GB" altLang="en-US" dirty="0"/>
           </a:p>
         </p:txBody>
       </p:sp>
@@ -12072,29 +11832,21 @@
             </a:r>
           </a:p>
           <a:p>
-            <a:endParaRPr lang="en-GB" altLang="en-US" dirty="0" smtClean="0"/>
-          </a:p>
-          <a:p>
-            <a:r>
-              <a:rPr lang="en-GB" altLang="en-US" dirty="0" smtClean="0"/>
-              <a:t>Branches </a:t>
-            </a:r>
+            <a:endParaRPr lang="en-GB" altLang="en-US" dirty="0"/>
+          </a:p>
+          <a:p>
             <a:r>
               <a:rPr lang="en-GB" altLang="en-US" dirty="0"/>
-              <a:t>of mathematics devoted to it</a:t>
-            </a:r>
-          </a:p>
-          <a:p>
-            <a:endParaRPr lang="en-GB" altLang="en-US" dirty="0" smtClean="0"/>
-          </a:p>
-          <a:p>
-            <a:r>
-              <a:rPr lang="en-GB" altLang="en-US" dirty="0" smtClean="0"/>
-              <a:t>It </a:t>
-            </a:r>
+              <a:t>Branches of mathematics devoted to it</a:t>
+            </a:r>
+          </a:p>
+          <a:p>
+            <a:endParaRPr lang="en-GB" altLang="en-US" dirty="0"/>
+          </a:p>
+          <a:p>
             <a:r>
               <a:rPr lang="en-GB" altLang="en-US" dirty="0"/>
-              <a:t>enables us to do logical reasoning</a:t>
+              <a:t>It enables us to do logical reasoning</a:t>
             </a:r>
           </a:p>
           <a:p>
@@ -12105,16 +11857,12 @@
             </a:r>
           </a:p>
           <a:p>
-            <a:endParaRPr lang="en-GB" altLang="en-US" dirty="0" smtClean="0"/>
-          </a:p>
-          <a:p>
-            <a:r>
-              <a:rPr lang="en-GB" altLang="en-US" dirty="0" smtClean="0"/>
-              <a:t>Basis </a:t>
-            </a:r>
+            <a:endParaRPr lang="en-GB" altLang="en-US" dirty="0"/>
+          </a:p>
+          <a:p>
             <a:r>
               <a:rPr lang="en-GB" altLang="en-US" dirty="0"/>
-              <a:t>for programming languages</a:t>
+              <a:t>Basis for programming languages</a:t>
             </a:r>
           </a:p>
           <a:p>
@@ -12206,7 +11954,7 @@
           <a:p>
             <a:pPr algn="ctr"/>
             <a:r>
-              <a:rPr lang="en-US" b="1" dirty="0" err="1" smtClean="0"/>
+              <a:rPr lang="en-US" b="1" dirty="0" err="1"/>
               <a:t>Associationism</a:t>
             </a:r>
             <a:endParaRPr lang="en-US" sz="4800" dirty="0"/>
@@ -12237,28 +11985,28 @@
           <a:p>
             <a:pPr eaLnBrk="1" hangingPunct="1"/>
             <a:r>
-              <a:rPr lang="en-US" b="1" dirty="0" smtClean="0"/>
+              <a:rPr lang="en-US" b="1" dirty="0"/>
               <a:t>Facts Perceived Directly By Senses:</a:t>
             </a:r>
           </a:p>
           <a:p>
             <a:pPr lvl="1"/>
             <a:r>
-              <a:rPr lang="en-US" b="1" i="1" dirty="0" smtClean="0"/>
+              <a:rPr lang="en-US" b="1" i="1" dirty="0"/>
               <a:t>Cold / Hot is a feeling I sense</a:t>
             </a:r>
           </a:p>
           <a:p>
             <a:pPr lvl="1"/>
             <a:r>
-              <a:rPr lang="en-US" sz="1800" b="1" i="1" dirty="0" smtClean="0"/>
+              <a:rPr lang="en-US" sz="1800" b="1" i="1" dirty="0"/>
               <a:t>Hard / Soft</a:t>
             </a:r>
           </a:p>
           <a:p>
             <a:pPr lvl="1"/>
             <a:r>
-              <a:rPr lang="en-US" b="1" i="1" dirty="0" smtClean="0"/>
+              <a:rPr lang="en-US" b="1" i="1" dirty="0"/>
               <a:t>Etc.</a:t>
             </a:r>
           </a:p>
@@ -12268,35 +12016,35 @@
           </a:p>
           <a:p>
             <a:r>
-              <a:rPr lang="en-US" b="1" dirty="0" smtClean="0"/>
+              <a:rPr lang="en-US" b="1" dirty="0"/>
               <a:t>Connections Built Up From This:</a:t>
             </a:r>
           </a:p>
           <a:p>
             <a:pPr lvl="1"/>
             <a:r>
-              <a:rPr lang="en-US" sz="1800" b="1" i="1" dirty="0" smtClean="0"/>
+              <a:rPr lang="en-US" sz="1800" b="1" i="1" dirty="0"/>
               <a:t>Snow is white (a color I perceive directly)</a:t>
             </a:r>
           </a:p>
           <a:p>
             <a:pPr lvl="1"/>
             <a:r>
-              <a:rPr lang="en-US" b="1" i="1" dirty="0" smtClean="0"/>
+              <a:rPr lang="en-US" b="1" i="1" dirty="0"/>
               <a:t>Snow is cold</a:t>
             </a:r>
           </a:p>
           <a:p>
             <a:pPr lvl="1"/>
             <a:r>
-              <a:rPr lang="en-US" sz="1800" b="1" i="1" dirty="0" smtClean="0"/>
+              <a:rPr lang="en-US" sz="1800" b="1" i="1" dirty="0"/>
               <a:t>Snow is soft</a:t>
             </a:r>
           </a:p>
           <a:p>
             <a:pPr lvl="1"/>
             <a:r>
-              <a:rPr lang="en-US" b="1" i="1" dirty="0" smtClean="0"/>
+              <a:rPr lang="en-US" b="1" i="1" dirty="0"/>
               <a:t>Etc…</a:t>
             </a:r>
             <a:endParaRPr lang="en-US" sz="1800" i="1" dirty="0"/>
@@ -12405,11 +12153,11 @@
           <a:p>
             <a:pPr algn="ctr"/>
             <a:r>
-              <a:rPr lang="en-US" b="1" dirty="0" err="1" smtClean="0"/>
+              <a:rPr lang="en-US" b="1" dirty="0" err="1"/>
               <a:t>Associationism</a:t>
             </a:r>
             <a:r>
-              <a:rPr lang="en-US" b="1" dirty="0" smtClean="0"/>
+              <a:rPr lang="en-US" b="1" dirty="0"/>
               <a:t>: Inheritance</a:t>
             </a:r>
             <a:endParaRPr lang="en-US" sz="4800" dirty="0"/>
@@ -12440,21 +12188,21 @@
           <a:p>
             <a:pPr eaLnBrk="1" hangingPunct="1"/>
             <a:r>
-              <a:rPr lang="en-US" b="1" dirty="0" smtClean="0"/>
+              <a:rPr lang="en-US" b="1" dirty="0"/>
               <a:t>Consider the two questions:</a:t>
             </a:r>
           </a:p>
           <a:p>
             <a:pPr lvl="1"/>
             <a:r>
-              <a:rPr lang="en-US" sz="1600" b="1" i="1" dirty="0" smtClean="0"/>
+              <a:rPr lang="en-US" sz="1600" b="1" i="1" dirty="0"/>
               <a:t>Can a Canary Sing?</a:t>
             </a:r>
           </a:p>
           <a:p>
             <a:pPr lvl="1"/>
             <a:r>
-              <a:rPr lang="en-US" sz="1600" b="1" i="1" dirty="0" smtClean="0"/>
+              <a:rPr lang="en-US" sz="1600" b="1" i="1" dirty="0"/>
               <a:t>Can a Canary Fly?</a:t>
             </a:r>
           </a:p>
@@ -12464,32 +12212,31 @@
           </a:p>
           <a:p>
             <a:r>
-              <a:rPr lang="en-US" i="1" dirty="0" smtClean="0"/>
+              <a:rPr lang="en-US" i="1" dirty="0"/>
               <a:t>Collins and </a:t>
             </a:r>
             <a:r>
-              <a:rPr lang="en-US" i="1" dirty="0" err="1" smtClean="0"/>
+              <a:rPr lang="en-US" i="1" dirty="0" err="1"/>
               <a:t>Quillian</a:t>
             </a:r>
             <a:r>
-              <a:rPr lang="en-US" i="1" dirty="0" smtClean="0"/>
+              <a:rPr lang="en-US" i="1" dirty="0"/>
               <a:t> (1969) showed that human knowledge is hierarchical.</a:t>
             </a:r>
           </a:p>
           <a:p>
             <a:pPr lvl="1"/>
             <a:r>
-              <a:rPr lang="en-US" i="1" dirty="0" smtClean="0"/>
+              <a:rPr lang="en-US" i="1" dirty="0"/>
               <a:t>Can answer first question quickly…why?</a:t>
             </a:r>
           </a:p>
           <a:p>
             <a:pPr lvl="1"/>
             <a:r>
-              <a:rPr lang="en-US" i="1" dirty="0" smtClean="0"/>
+              <a:rPr lang="en-US" i="1" dirty="0"/>
               <a:t>Second question takes longer…why?</a:t>
             </a:r>
-            <a:endParaRPr lang="en-US" i="1" dirty="0"/>
           </a:p>
           <a:p>
             <a:pPr lvl="1" eaLnBrk="1" hangingPunct="1">
@@ -12595,11 +12342,11 @@
           <a:p>
             <a:pPr algn="ctr"/>
             <a:r>
-              <a:rPr lang="en-US" b="1" dirty="0" err="1" smtClean="0"/>
+              <a:rPr lang="en-US" b="1" dirty="0" err="1"/>
               <a:t>Associationism</a:t>
             </a:r>
             <a:r>
-              <a:rPr lang="en-US" b="1" dirty="0" smtClean="0"/>
+              <a:rPr lang="en-US" b="1" dirty="0"/>
               <a:t>: Inheritance</a:t>
             </a:r>
             <a:endParaRPr lang="en-US" sz="4800" dirty="0"/>
@@ -12708,7 +12455,7 @@
           <a:p>
             <a:pPr algn="ctr"/>
             <a:r>
-              <a:rPr lang="en-US" b="1" dirty="0" smtClean="0"/>
+              <a:rPr lang="en-US" b="1" dirty="0"/>
               <a:t>Semantic Net</a:t>
             </a:r>
             <a:endParaRPr lang="en-US" sz="4800" dirty="0"/>
@@ -13114,14 +12861,14 @@
           <a:p>
             <a:pPr fontAlgn="auto"/>
             <a:r>
-              <a:rPr lang="en-US" b="1" dirty="0" smtClean="0"/>
+              <a:rPr lang="en-US" b="1" dirty="0"/>
               <a:t>This is called a Semantic Net:</a:t>
             </a:r>
           </a:p>
           <a:p>
             <a:pPr lvl="1" fontAlgn="auto"/>
             <a:r>
-              <a:rPr lang="en-US" i="1" dirty="0" smtClean="0"/>
+              <a:rPr lang="en-US" i="1" dirty="0"/>
               <a:t>Objects – Things we observe in the world, can be abstract like ‘Animal’</a:t>
             </a:r>
           </a:p>
@@ -13132,14 +12879,13 @@
           <a:p>
             <a:pPr lvl="1" fontAlgn="auto"/>
             <a:r>
-              <a:rPr lang="en-US" i="1" dirty="0" smtClean="0"/>
+              <a:rPr lang="en-US" i="1" dirty="0"/>
               <a:t>Relationships – between objects. Note the semantic information on the edges in the graph</a:t>
             </a:r>
-            <a:endParaRPr lang="en-US" i="1" dirty="0"/>
           </a:p>
           <a:p>
             <a:pPr lvl="1" fontAlgn="auto"/>
-            <a:endParaRPr lang="en-US" sz="1800" dirty="0" smtClean="0"/>
+            <a:endParaRPr lang="en-US" sz="1800" dirty="0"/>
           </a:p>
           <a:p>
             <a:pPr lvl="1" fontAlgn="auto">
@@ -13204,7 +12950,7 @@
           <a:p>
             <a:pPr algn="ctr"/>
             <a:r>
-              <a:rPr lang="en-US" b="1" dirty="0" smtClean="0"/>
+              <a:rPr lang="en-US" b="1" dirty="0"/>
               <a:t>Semantic Net</a:t>
             </a:r>
             <a:endParaRPr lang="en-US" sz="4800" dirty="0"/>
@@ -13610,7 +13356,7 @@
           <a:p>
             <a:pPr fontAlgn="auto"/>
             <a:r>
-              <a:rPr lang="en-US" b="1" dirty="0" smtClean="0"/>
+              <a:rPr lang="en-US" b="1" dirty="0"/>
               <a:t>How might we acquire new knowledge though?</a:t>
             </a:r>
           </a:p>
@@ -13621,14 +13367,14 @@
           <a:p>
             <a:pPr lvl="1" fontAlgn="auto"/>
             <a:r>
-              <a:rPr lang="en-US" b="1" i="1" dirty="0" smtClean="0"/>
+              <a:rPr lang="en-US" b="1" i="1" dirty="0"/>
               <a:t>Think about our direct senses with the environment?</a:t>
             </a:r>
             <a:endParaRPr lang="en-US" i="1" dirty="0"/>
           </a:p>
           <a:p>
             <a:pPr lvl="1" fontAlgn="auto"/>
-            <a:endParaRPr lang="en-US" sz="1800" dirty="0" smtClean="0"/>
+            <a:endParaRPr lang="en-US" sz="1800" dirty="0"/>
           </a:p>
           <a:p>
             <a:pPr lvl="1" fontAlgn="auto">
@@ -13724,16 +13470,12 @@
             </a:r>
           </a:p>
           <a:p>
-            <a:endParaRPr lang="en-GB" altLang="en-US" dirty="0" smtClean="0"/>
-          </a:p>
-          <a:p>
-            <a:r>
-              <a:rPr lang="en-GB" altLang="en-US" dirty="0" smtClean="0"/>
-              <a:t>Equivalent </a:t>
-            </a:r>
+            <a:endParaRPr lang="en-GB" altLang="en-US" dirty="0"/>
+          </a:p>
+          <a:p>
             <a:r>
               <a:rPr lang="en-GB" altLang="en-US" dirty="0"/>
-              <a:t>to logical statements (usually FOL)</a:t>
+              <a:t>Equivalent to logical statements (usually FOL)</a:t>
             </a:r>
           </a:p>
           <a:p>
@@ -13751,16 +13493,12 @@
             </a:r>
           </a:p>
           <a:p>
-            <a:endParaRPr lang="en-GB" altLang="en-US" dirty="0" smtClean="0"/>
-          </a:p>
-          <a:p>
-            <a:r>
-              <a:rPr lang="en-GB" altLang="en-US" dirty="0" smtClean="0"/>
-              <a:t>Example</a:t>
-            </a:r>
+            <a:endParaRPr lang="en-GB" altLang="en-US" dirty="0"/>
+          </a:p>
+          <a:p>
             <a:r>
               <a:rPr lang="en-GB" altLang="en-US" dirty="0"/>
-              <a:t>: natural language understanding</a:t>
+              <a:t>Example: natural language understanding</a:t>
             </a:r>
           </a:p>
           <a:p>
@@ -13841,7 +13579,7 @@
           <a:p>
             <a:pPr algn="ctr"/>
             <a:r>
-              <a:rPr lang="en-US" b="1" dirty="0" smtClean="0"/>
+              <a:rPr lang="en-US" b="1" dirty="0"/>
               <a:t>Semantic Net</a:t>
             </a:r>
             <a:endParaRPr lang="en-US" sz="4800" dirty="0"/>
@@ -14223,29 +13961,29 @@
           <a:p>
             <a:pPr fontAlgn="auto"/>
             <a:r>
-              <a:rPr lang="en-US" dirty="0" smtClean="0"/>
+              <a:rPr lang="en-US" dirty="0"/>
               <a:t>By </a:t>
             </a:r>
             <a:r>
-              <a:rPr lang="en-US" dirty="0" err="1" smtClean="0"/>
+              <a:rPr lang="en-US" dirty="0" err="1"/>
               <a:t>Quillian</a:t>
             </a:r>
             <a:r>
-              <a:rPr lang="en-US" dirty="0" smtClean="0"/>
+              <a:rPr lang="en-US" dirty="0"/>
               <a:t> (same). Able to write a program that was asked about similarity between cry and comfort.</a:t>
             </a:r>
           </a:p>
           <a:p>
             <a:pPr fontAlgn="auto"/>
             <a:r>
-              <a:rPr lang="en-US" sz="2000" dirty="0" smtClean="0"/>
+              <a:rPr lang="en-US" sz="2000" dirty="0"/>
               <a:t>Program outputted:</a:t>
             </a:r>
           </a:p>
           <a:p>
             <a:pPr lvl="1" fontAlgn="auto"/>
             <a:r>
-              <a:rPr lang="en-US" sz="1800" dirty="0" smtClean="0"/>
+              <a:rPr lang="en-US" sz="1800" dirty="0"/>
               <a:t>“Cry (2) is among other things to make a sad sound. To comfort (3) can be to make (2) something less sad.”</a:t>
             </a:r>
           </a:p>
@@ -14336,16 +14074,16 @@
               <a:buNone/>
             </a:pPr>
             <a:r>
-              <a:rPr lang="en-US" sz="2400" b="1" dirty="0" smtClean="0"/>
+              <a:rPr lang="en-US" sz="2400" b="1" dirty="0"/>
               <a:t>Physical Symbol Systems</a:t>
             </a:r>
           </a:p>
           <a:p>
-            <a:endParaRPr lang="en-US" dirty="0" smtClean="0"/>
-          </a:p>
-          <a:p>
-            <a:r>
-              <a:rPr lang="en-US" dirty="0" smtClean="0"/>
+            <a:endParaRPr lang="en-US" dirty="0"/>
+          </a:p>
+          <a:p>
+            <a:r>
+              <a:rPr lang="en-US" dirty="0"/>
               <a:t>Newell and Simon (left)</a:t>
             </a:r>
           </a:p>
@@ -14355,22 +14093,22 @@
           </a:p>
           <a:p>
             <a:r>
-              <a:rPr lang="en-US" dirty="0" smtClean="0"/>
+              <a:rPr lang="en-US" dirty="0"/>
               <a:t>Axiom (maybe):</a:t>
             </a:r>
           </a:p>
           <a:p>
             <a:pPr lvl="1"/>
             <a:r>
-              <a:rPr lang="en-US" b="1" i="1" dirty="0" smtClean="0"/>
+              <a:rPr lang="en-US" b="1" i="1" dirty="0"/>
               <a:t>Computers and minds</a:t>
             </a:r>
             <a:r>
-              <a:rPr lang="en-US" dirty="0" smtClean="0"/>
+              <a:rPr lang="en-US" dirty="0"/>
               <a:t> are both examples of </a:t>
             </a:r>
             <a:r>
-              <a:rPr lang="en-US" b="1" i="1" dirty="0" smtClean="0"/>
+              <a:rPr lang="en-US" b="1" i="1" dirty="0"/>
               <a:t>physical symbol systems</a:t>
             </a:r>
           </a:p>
@@ -14380,34 +14118,33 @@
           </a:p>
           <a:p>
             <a:r>
-              <a:rPr lang="en-US" b="1" i="1" u="sng" dirty="0" smtClean="0"/>
+              <a:rPr lang="en-US" b="1" i="1" u="sng" dirty="0"/>
               <a:t>Symbol</a:t>
             </a:r>
             <a:r>
-              <a:rPr lang="en-US" dirty="0" smtClean="0"/>
+              <a:rPr lang="en-US" dirty="0"/>
               <a:t>: A meaningful pattern that can be manipulated</a:t>
             </a:r>
           </a:p>
           <a:p>
             <a:r>
-              <a:rPr lang="en-US" b="1" i="1" u="sng" dirty="0" smtClean="0"/>
+              <a:rPr lang="en-US" b="1" i="1" u="sng" dirty="0"/>
               <a:t>Symbol System</a:t>
             </a:r>
             <a:r>
-              <a:rPr lang="en-US" dirty="0" smtClean="0"/>
+              <a:rPr lang="en-US" dirty="0"/>
               <a:t>: Creates, modifies, destroys, etc. symbols</a:t>
             </a:r>
           </a:p>
           <a:p>
             <a:r>
-              <a:rPr lang="en-US" b="1" i="1" u="sng" dirty="0" smtClean="0"/>
+              <a:rPr lang="en-US" b="1" i="1" u="sng" dirty="0"/>
               <a:t>Physical</a:t>
             </a:r>
             <a:r>
-              <a:rPr lang="en-US" dirty="0" smtClean="0"/>
+              <a:rPr lang="en-US" dirty="0"/>
               <a:t>: Exists directly in the world (controls physical muscles, etc.)</a:t>
             </a:r>
-            <a:endParaRPr lang="en-US" dirty="0"/>
           </a:p>
         </p:txBody>
       </p:sp>
@@ -14462,13 +14199,6 @@
   <p:clrMapOvr>
     <a:masterClrMapping/>
   </p:clrMapOvr>
-  <p:timing>
-    <p:tnLst>
-      <p:par>
-        <p:cTn id="1" dur="indefinite" restart="never" nodeType="tmRoot"/>
-      </p:par>
-    </p:tnLst>
-  </p:timing>
 </p:sld>
 </file>
 
@@ -14511,20 +14241,12 @@
           <a:p>
             <a:pPr eaLnBrk="1" hangingPunct="1"/>
             <a:r>
-              <a:rPr lang="en-US" sz="3200" b="1" dirty="0" smtClean="0"/>
+              <a:rPr lang="en-US" sz="3200" b="1" dirty="0"/>
               <a:t>Frames</a:t>
-            </a:r>
-            <a:r>
-              <a:rPr lang="en-US" sz="3200" b="1" dirty="0"/>
-              <a:t/>
             </a:r>
             <a:br>
               <a:rPr lang="en-US" sz="3200" b="1" dirty="0"/>
             </a:br>
-            <a:r>
-              <a:rPr lang="en-US" sz="3200" dirty="0"/>
-              <a:t/>
-            </a:r>
             <a:br>
               <a:rPr lang="en-US" sz="3200" dirty="0"/>
             </a:br>
@@ -14624,16 +14346,12 @@
             </a:r>
           </a:p>
           <a:p>
-            <a:endParaRPr lang="en-GB" altLang="en-US" dirty="0" smtClean="0"/>
-          </a:p>
-          <a:p>
-            <a:r>
-              <a:rPr lang="en-GB" altLang="en-US" dirty="0" smtClean="0"/>
-              <a:t>When </a:t>
-            </a:r>
+            <a:endParaRPr lang="en-GB" altLang="en-US" dirty="0"/>
+          </a:p>
+          <a:p>
             <a:r>
               <a:rPr lang="en-GB" altLang="en-US" dirty="0"/>
-              <a:t>agent faces a </a:t>
+              <a:t>When agent faces a </a:t>
             </a:r>
             <a:r>
               <a:rPr lang="en-GB" altLang="en-US" b="1" u="sng" dirty="0"/>
@@ -14666,16 +14384,12 @@
             </a:r>
           </a:p>
           <a:p>
-            <a:endParaRPr lang="en-GB" altLang="en-US" dirty="0" smtClean="0"/>
-          </a:p>
-          <a:p>
-            <a:r>
-              <a:rPr lang="en-GB" altLang="en-US" b="1" i="1" dirty="0" smtClean="0"/>
-              <a:t>Inheritance </a:t>
-            </a:r>
+            <a:endParaRPr lang="en-GB" altLang="en-US" dirty="0"/>
+          </a:p>
+          <a:p>
             <a:r>
               <a:rPr lang="en-GB" altLang="en-US" b="1" i="1" dirty="0"/>
-              <a:t>of properties</a:t>
+              <a:t>Inheritance of properties</a:t>
             </a:r>
             <a:r>
               <a:rPr lang="en-GB" altLang="en-US" dirty="0"/>
@@ -14778,7 +14492,7 @@
           <a:graphicData uri="http://schemas.openxmlformats.org/presentationml/2006/ole">
             <mc:AlternateContent xmlns:mc="http://schemas.openxmlformats.org/markup-compatibility/2006">
               <mc:Choice xmlns:v="urn:schemas-microsoft-com:vml" Requires="v">
-                <p:oleObj spid="_x0000_s39958" name="Bitmap Image" r:id="rId3" imgW="6190476" imgH="3000000" progId="PBrush">
+                <p:oleObj spid="_x0000_s39959" name="Bitmap Image" r:id="rId3" imgW="6190476" imgH="3000000" progId="PBrush">
                   <p:embed/>
                 </p:oleObj>
               </mc:Choice>
@@ -15099,20 +14813,15 @@
           <a:p>
             <a:r>
               <a:rPr lang="en-GB" altLang="en-US" dirty="0"/>
-              <a:t>Can also be expressed in first order </a:t>
-            </a:r>
-            <a:r>
-              <a:rPr lang="en-GB" altLang="en-US" dirty="0" smtClean="0"/>
-              <a:t>logic</a:t>
+              <a:t>Can also be expressed in first order logic</a:t>
             </a:r>
           </a:p>
           <a:p>
             <a:pPr lvl="1"/>
             <a:r>
-              <a:rPr lang="en-GB" altLang="en-US" dirty="0" smtClean="0"/>
+              <a:rPr lang="en-GB" altLang="en-US" dirty="0"/>
               <a:t>So essentially equivalent</a:t>
             </a:r>
-            <a:endParaRPr lang="en-GB" altLang="en-US" dirty="0"/>
           </a:p>
         </p:txBody>
       </p:sp>
@@ -15196,12 +14905,8 @@
           <a:p>
             <a:pPr lvl="1"/>
             <a:r>
-              <a:rPr lang="en-GB" altLang="en-US" dirty="0" smtClean="0"/>
-              <a:t>Semantic </a:t>
-            </a:r>
-            <a:r>
               <a:rPr lang="en-GB" altLang="en-US" dirty="0"/>
-              <a:t>networks</a:t>
+              <a:t>Semantic networks</a:t>
             </a:r>
           </a:p>
           <a:p>
@@ -15212,29 +14917,21 @@
             </a:r>
           </a:p>
           <a:p>
-            <a:endParaRPr lang="en-GB" altLang="en-US" dirty="0" smtClean="0"/>
-          </a:p>
-          <a:p>
-            <a:r>
-              <a:rPr lang="en-GB" altLang="en-US" dirty="0" smtClean="0"/>
-              <a:t>But </a:t>
-            </a:r>
+            <a:endParaRPr lang="en-GB" altLang="en-US" dirty="0"/>
+          </a:p>
+          <a:p>
             <a:r>
               <a:rPr lang="en-GB" altLang="en-US" dirty="0"/>
-              <a:t>all can be expressed in first order logic!</a:t>
-            </a:r>
-          </a:p>
-          <a:p>
-            <a:endParaRPr lang="en-GB" altLang="en-US" dirty="0" smtClean="0"/>
-          </a:p>
-          <a:p>
-            <a:r>
-              <a:rPr lang="en-GB" altLang="en-US" dirty="0" smtClean="0"/>
-              <a:t>Best </a:t>
-            </a:r>
+              <a:t>But all can be expressed in first order logic!</a:t>
+            </a:r>
+          </a:p>
+          <a:p>
+            <a:endParaRPr lang="en-GB" altLang="en-US" dirty="0"/>
+          </a:p>
+          <a:p>
             <a:r>
               <a:rPr lang="en-GB" altLang="en-US" dirty="0"/>
-              <a:t>of both worlds</a:t>
+              <a:t>Best of both worlds</a:t>
             </a:r>
           </a:p>
           <a:p>
@@ -15314,20 +15011,20 @@
               <a:buNone/>
             </a:pPr>
             <a:r>
-              <a:rPr lang="en-US" sz="2400" b="1" dirty="0" smtClean="0"/>
+              <a:rPr lang="en-US" sz="2400" b="1" dirty="0"/>
               <a:t>Physical Symbol System Hypothesis</a:t>
             </a:r>
           </a:p>
           <a:p>
             <a:pPr algn="ctr"/>
-            <a:endParaRPr lang="en-US" dirty="0" smtClean="0"/>
+            <a:endParaRPr lang="en-US" dirty="0"/>
           </a:p>
           <a:p>
             <a:pPr marL="36900" indent="0" algn="ctr">
               <a:buNone/>
             </a:pPr>
             <a:r>
-              <a:rPr lang="en-US" dirty="0" smtClean="0"/>
+              <a:rPr lang="en-US" dirty="0"/>
               <a:t>Hypothesis:</a:t>
             </a:r>
           </a:p>
@@ -15342,7 +15039,7 @@
               <a:buNone/>
             </a:pPr>
             <a:r>
-              <a:rPr lang="en-US" i="1" dirty="0" smtClean="0"/>
+              <a:rPr lang="en-US" i="1" dirty="0"/>
               <a:t>A physical symbol system has the necessary and sufficient means for general intelligent action</a:t>
             </a:r>
           </a:p>
@@ -15363,7 +15060,7 @@
               <a:buNone/>
             </a:pPr>
             <a:r>
-              <a:rPr lang="en-US" dirty="0" smtClean="0"/>
+              <a:rPr lang="en-US" dirty="0"/>
               <a:t>Thoughts on this?</a:t>
             </a:r>
           </a:p>
@@ -15372,10 +15069,9 @@
               <a:buNone/>
             </a:pPr>
             <a:r>
-              <a:rPr lang="en-US" dirty="0" smtClean="0"/>
+              <a:rPr lang="en-US" dirty="0"/>
               <a:t>Discuss the reading with those around you. Make a list of five “thoughtful observations” regarding the reading and physical symbol systems.</a:t>
             </a:r>
-            <a:endParaRPr lang="en-US" dirty="0"/>
           </a:p>
         </p:txBody>
       </p:sp>
@@ -15430,13 +15126,6 @@
   <p:clrMapOvr>
     <a:masterClrMapping/>
   </p:clrMapOvr>
-  <p:timing>
-    <p:tnLst>
-      <p:par>
-        <p:cTn id="1" dur="indefinite" restart="never" nodeType="tmRoot"/>
-      </p:par>
-    </p:tnLst>
-  </p:timing>
 </p:sld>
 </file>
 
@@ -15526,16 +15215,12 @@
             </a:r>
           </a:p>
           <a:p>
-            <a:endParaRPr lang="en-GB" altLang="en-US" dirty="0" smtClean="0"/>
-          </a:p>
-          <a:p>
-            <a:r>
-              <a:rPr lang="en-GB" altLang="en-US" dirty="0" smtClean="0"/>
-              <a:t>Right </a:t>
-            </a:r>
+            <a:endParaRPr lang="en-GB" altLang="en-US" dirty="0"/>
+          </a:p>
+          <a:p>
             <a:r>
               <a:rPr lang="en-GB" altLang="en-US" dirty="0"/>
-              <a:t>representation is crucial</a:t>
+              <a:t>Right representation is crucial</a:t>
             </a:r>
           </a:p>
           <a:p>
@@ -15670,14 +15355,13 @@
             </a:r>
           </a:p>
           <a:p>
-            <a:endParaRPr lang="en-GB" altLang="en-US" sz="2400" dirty="0" smtClean="0"/>
-          </a:p>
-          <a:p>
-            <a:r>
-              <a:rPr lang="en-GB" altLang="en-US" sz="2400" dirty="0" smtClean="0"/>
+            <a:endParaRPr lang="en-GB" altLang="en-US" sz="2400" dirty="0"/>
+          </a:p>
+          <a:p>
+            <a:r>
+              <a:rPr lang="en-GB" altLang="en-US" sz="2400" dirty="0"/>
               <a:t>Examples</a:t>
             </a:r>
-            <a:endParaRPr lang="en-GB" altLang="en-US" sz="2400" dirty="0"/>
           </a:p>
           <a:p>
             <a:pPr lvl="1"/>
@@ -15697,13 +15381,8 @@
             <a:pPr lvl="1"/>
             <a:r>
               <a:rPr lang="en-GB" altLang="en-US" sz="2000" dirty="0"/>
-              <a:t>Neural networks learning… neural </a:t>
-            </a:r>
-            <a:r>
-              <a:rPr lang="en-GB" altLang="en-US" sz="2000" dirty="0" smtClean="0"/>
-              <a:t>networks</a:t>
-            </a:r>
-            <a:endParaRPr lang="en-GB" altLang="en-US" sz="2000" dirty="0"/>
+              <a:t>Neural networks learning… neural networks</a:t>
+            </a:r>
           </a:p>
         </p:txBody>
       </p:sp>
@@ -15792,17 +15471,16 @@
           <a:p>
             <a:pPr eaLnBrk="1" hangingPunct="1"/>
             <a:r>
-              <a:rPr lang="en-US" b="1" dirty="0" smtClean="0"/>
+              <a:rPr lang="en-US" b="1" dirty="0"/>
               <a:t>Goals:</a:t>
             </a:r>
           </a:p>
           <a:p>
             <a:pPr lvl="1"/>
             <a:r>
-              <a:rPr lang="en-US" sz="2000" dirty="0" smtClean="0"/>
+              <a:rPr lang="en-US" sz="2000" dirty="0"/>
               <a:t>To represent the knowledge in the world in a way that allows for an AI to “reason”</a:t>
             </a:r>
-            <a:endParaRPr lang="en-US" sz="2000" dirty="0"/>
           </a:p>
           <a:p>
             <a:pPr lvl="1" eaLnBrk="1" hangingPunct="1">
@@ -16188,65 +15866,65 @@
           <a:p>
             <a:pPr fontAlgn="auto"/>
             <a:r>
-              <a:rPr lang="en-US" b="1" dirty="0" smtClean="0"/>
+              <a:rPr lang="en-US" b="1" dirty="0"/>
               <a:t>What to Represent?</a:t>
             </a:r>
           </a:p>
           <a:p>
             <a:pPr lvl="1" fontAlgn="auto"/>
             <a:r>
-              <a:rPr lang="en-US" sz="2000" b="1" dirty="0" smtClean="0"/>
+              <a:rPr lang="en-US" sz="2000" b="1" dirty="0"/>
               <a:t>Objects</a:t>
             </a:r>
-            <a:endParaRPr lang="en-US" sz="2000" dirty="0" smtClean="0"/>
+            <a:endParaRPr lang="en-US" sz="2000" dirty="0"/>
           </a:p>
           <a:p>
             <a:pPr lvl="2" fontAlgn="auto"/>
             <a:r>
-              <a:rPr lang="en-US" sz="2000" dirty="0" smtClean="0"/>
+              <a:rPr lang="en-US" sz="2000" dirty="0"/>
               <a:t>-- Facts about objects in our world domain. </a:t>
             </a:r>
             <a:r>
-              <a:rPr lang="en-US" sz="2000" i="1" dirty="0" smtClean="0"/>
+              <a:rPr lang="en-US" sz="2000" i="1" dirty="0"/>
               <a:t>e.g.</a:t>
             </a:r>
             <a:r>
-              <a:rPr lang="en-US" sz="2000" dirty="0" smtClean="0"/>
+              <a:rPr lang="en-US" sz="2000" dirty="0"/>
               <a:t> Guitars have strings, trumpets are brass instruments.</a:t>
             </a:r>
           </a:p>
           <a:p>
             <a:pPr lvl="1" fontAlgn="auto"/>
-            <a:endParaRPr lang="en-US" sz="2000" b="1" dirty="0" smtClean="0"/>
+            <a:endParaRPr lang="en-US" sz="2000" b="1" dirty="0"/>
           </a:p>
           <a:p>
             <a:pPr lvl="1" fontAlgn="auto"/>
             <a:r>
-              <a:rPr lang="en-US" sz="2000" b="1" dirty="0" smtClean="0"/>
+              <a:rPr lang="en-US" sz="2000" b="1" dirty="0"/>
               <a:t>Events</a:t>
             </a:r>
-            <a:endParaRPr lang="en-US" sz="2000" dirty="0" smtClean="0"/>
+            <a:endParaRPr lang="en-US" sz="2000" dirty="0"/>
           </a:p>
           <a:p>
             <a:pPr lvl="2" fontAlgn="auto"/>
             <a:r>
-              <a:rPr lang="en-US" sz="2000" dirty="0" smtClean="0"/>
+              <a:rPr lang="en-US" sz="2000" dirty="0"/>
               <a:t>-- Actions that occur in our world. </a:t>
             </a:r>
             <a:r>
-              <a:rPr lang="en-US" sz="2000" i="1" dirty="0" smtClean="0"/>
+              <a:rPr lang="en-US" sz="2000" i="1" dirty="0"/>
               <a:t>e.g.</a:t>
             </a:r>
             <a:r>
-              <a:rPr lang="en-US" sz="2000" dirty="0" smtClean="0"/>
+              <a:rPr lang="en-US" sz="2000" dirty="0"/>
               <a:t> Steve </a:t>
             </a:r>
             <a:r>
-              <a:rPr lang="en-US" sz="2000" dirty="0" err="1" smtClean="0"/>
+              <a:rPr lang="en-US" sz="2000" dirty="0" err="1"/>
               <a:t>Vai</a:t>
             </a:r>
             <a:r>
-              <a:rPr lang="en-US" sz="2000" dirty="0" smtClean="0"/>
+              <a:rPr lang="en-US" sz="2000" dirty="0"/>
               <a:t> played the guitar in Frank Zappa's Band.</a:t>
             </a:r>
           </a:p>
@@ -16264,13 +15942,6 @@
   <p:clrMapOvr>
     <a:masterClrMapping/>
   </p:clrMapOvr>
-  <p:timing>
-    <p:tnLst>
-      <p:par>
-        <p:cTn id="1" dur="indefinite" restart="never" nodeType="tmRoot"/>
-      </p:par>
-    </p:tnLst>
-  </p:timing>
 </p:sld>
 </file>
 
@@ -16346,17 +16017,16 @@
           <a:p>
             <a:pPr eaLnBrk="1" hangingPunct="1"/>
             <a:r>
-              <a:rPr lang="en-US" b="1" dirty="0" smtClean="0"/>
+              <a:rPr lang="en-US" b="1" dirty="0"/>
               <a:t>Goals:</a:t>
             </a:r>
           </a:p>
           <a:p>
             <a:pPr lvl="1"/>
             <a:r>
-              <a:rPr lang="en-US" sz="2000" dirty="0" smtClean="0"/>
+              <a:rPr lang="en-US" sz="2000" dirty="0"/>
               <a:t>To represent the knowledge in the world in a way that allows for an AI to “reason”</a:t>
             </a:r>
-            <a:endParaRPr lang="en-US" sz="2000" dirty="0"/>
           </a:p>
           <a:p>
             <a:pPr lvl="1" eaLnBrk="1" hangingPunct="1">
@@ -16798,13 +16468,6 @@
   <p:clrMapOvr>
     <a:masterClrMapping/>
   </p:clrMapOvr>
-  <p:timing>
-    <p:tnLst>
-      <p:par>
-        <p:cTn id="1" dur="indefinite" restart="never" nodeType="tmRoot"/>
-      </p:par>
-    </p:tnLst>
-  </p:timing>
 </p:sld>
 </file>
 

</xml_diff>